<commit_message>
change logo of sustech
</commit_message>
<xml_diff>
--- a/text/大湾区超构材料与微纳光学专题研讨会.pptx
+++ b/text/大湾区超构材料与微纳光学专题研讨会.pptx
@@ -219,7 +219,7 @@
             <a:fld id="{D2A48B96-639E-45A3-A0BA-2464DFDB1FAA}" type="datetimeFigureOut">
               <a:rPr lang="zh-CN" altLang="en-US" smtClean="0"/>
               <a:pPr/>
-              <a:t>2018/5/29</a:t>
+              <a:t>2018/5/31</a:t>
             </a:fld>
             <a:endParaRPr lang="zh-CN" altLang="en-US"/>
           </a:p>
@@ -3001,7 +3001,7 @@
             <a:fld id="{530820CF-B880-4189-942D-D702A7CBA730}" type="datetimeFigureOut">
               <a:rPr lang="zh-CN" altLang="en-US" smtClean="0"/>
               <a:pPr/>
-              <a:t>2018/5/29</a:t>
+              <a:t>2018/5/31</a:t>
             </a:fld>
             <a:endParaRPr lang="zh-CN" altLang="en-US"/>
           </a:p>
@@ -3184,7 +3184,7 @@
             <a:fld id="{530820CF-B880-4189-942D-D702A7CBA730}" type="datetimeFigureOut">
               <a:rPr lang="zh-CN" altLang="en-US" smtClean="0"/>
               <a:pPr/>
-              <a:t>2018/5/29</a:t>
+              <a:t>2018/5/31</a:t>
             </a:fld>
             <a:endParaRPr lang="zh-CN" altLang="en-US"/>
           </a:p>
@@ -3337,7 +3337,7 @@
             <a:fld id="{530820CF-B880-4189-942D-D702A7CBA730}" type="datetimeFigureOut">
               <a:rPr lang="zh-CN" altLang="en-US" smtClean="0"/>
               <a:pPr/>
-              <a:t>2018/5/29</a:t>
+              <a:t>2018/5/31</a:t>
             </a:fld>
             <a:endParaRPr lang="zh-CN" altLang="en-US"/>
           </a:p>
@@ -5125,7 +5125,7 @@
             <a:fld id="{530820CF-B880-4189-942D-D702A7CBA730}" type="datetimeFigureOut">
               <a:rPr lang="zh-CN" altLang="en-US" smtClean="0"/>
               <a:pPr/>
-              <a:t>2018/5/29</a:t>
+              <a:t>2018/5/31</a:t>
             </a:fld>
             <a:endParaRPr lang="zh-CN" altLang="en-US"/>
           </a:p>
@@ -6957,7 +6957,7 @@
             <a:fld id="{530820CF-B880-4189-942D-D702A7CBA730}" type="datetimeFigureOut">
               <a:rPr lang="zh-CN" altLang="en-US" smtClean="0"/>
               <a:pPr/>
-              <a:t>2018/5/29</a:t>
+              <a:t>2018/5/31</a:t>
             </a:fld>
             <a:endParaRPr lang="zh-CN" altLang="en-US"/>
           </a:p>
@@ -7072,7 +7072,7 @@
             <a:fld id="{530820CF-B880-4189-942D-D702A7CBA730}" type="datetimeFigureOut">
               <a:rPr lang="zh-CN" altLang="en-US" smtClean="0"/>
               <a:pPr/>
-              <a:t>2018/5/29</a:t>
+              <a:t>2018/5/31</a:t>
             </a:fld>
             <a:endParaRPr lang="zh-CN" altLang="en-US"/>
           </a:p>
@@ -7615,7 +7615,7 @@
             <a:fld id="{530820CF-B880-4189-942D-D702A7CBA730}" type="datetimeFigureOut">
               <a:rPr lang="zh-CN" altLang="en-US" smtClean="0"/>
               <a:pPr/>
-              <a:t>2018/5/29</a:t>
+              <a:t>2018/5/31</a:t>
             </a:fld>
             <a:endParaRPr lang="zh-CN" altLang="en-US"/>
           </a:p>
@@ -7730,7 +7730,7 @@
             <a:fld id="{530820CF-B880-4189-942D-D702A7CBA730}" type="datetimeFigureOut">
               <a:rPr lang="zh-CN" altLang="en-US" smtClean="0"/>
               <a:pPr/>
-              <a:t>2018/5/29</a:t>
+              <a:t>2018/5/31</a:t>
             </a:fld>
             <a:endParaRPr lang="zh-CN" altLang="en-US"/>
           </a:p>
@@ -9403,7 +9403,7 @@
             <a:fld id="{530820CF-B880-4189-942D-D702A7CBA730}" type="datetimeFigureOut">
               <a:rPr lang="zh-CN" altLang="en-US" smtClean="0"/>
               <a:pPr/>
-              <a:t>2018/5/29</a:t>
+              <a:t>2018/5/31</a:t>
             </a:fld>
             <a:endParaRPr lang="zh-CN" altLang="en-US"/>
           </a:p>
@@ -9556,7 +9556,7 @@
             <a:fld id="{530820CF-B880-4189-942D-D702A7CBA730}" type="datetimeFigureOut">
               <a:rPr lang="zh-CN" altLang="en-US" smtClean="0"/>
               <a:pPr/>
-              <a:t>2018/5/29</a:t>
+              <a:t>2018/5/31</a:t>
             </a:fld>
             <a:endParaRPr lang="zh-CN" altLang="en-US"/>
           </a:p>
@@ -13093,7 +13093,7 @@
             <a:fld id="{530820CF-B880-4189-942D-D702A7CBA730}" type="datetimeFigureOut">
               <a:rPr lang="zh-CN" altLang="en-US" smtClean="0"/>
               <a:pPr/>
-              <a:t>2018/5/29</a:t>
+              <a:t>2018/5/31</a:t>
             </a:fld>
             <a:endParaRPr lang="zh-CN" altLang="en-US"/>
           </a:p>
@@ -14914,7 +14914,7 @@
             <a:fld id="{530820CF-B880-4189-942D-D702A7CBA730}" type="datetimeFigureOut">
               <a:rPr lang="zh-CN" altLang="en-US" smtClean="0"/>
               <a:pPr/>
-              <a:t>2018/5/29</a:t>
+              <a:t>2018/5/31</a:t>
             </a:fld>
             <a:endParaRPr lang="zh-CN" altLang="en-US"/>
           </a:p>
@@ -15818,7 +15818,7 @@
           <p:nvPr>
             <p:extLst>
               <p:ext uri="{D42A27DB-BD31-4B8C-83A1-F6EECF244321}">
-                <p14:modId xmlns:p14="http://schemas.microsoft.com/office/powerpoint/2010/main" val="1079758329"/>
+                <p14:modId xmlns:p14="http://schemas.microsoft.com/office/powerpoint/2010/main" val="2019537688"/>
               </p:ext>
             </p:extLst>
           </p:nvPr>
@@ -15837,21 +15837,21 @@
                 <a:gridCol w="2180823">
                   <a:extLst>
                     <a:ext uri="{9D8B030D-6E8A-4147-A177-3AD203B41FA5}">
-                      <a16:colId xmlns="" xmlns:a16="http://schemas.microsoft.com/office/drawing/2014/main" val="20000"/>
+                      <a16:colId xmlns:a16="http://schemas.microsoft.com/office/drawing/2014/main" xmlns="" val="20000"/>
                     </a:ext>
                   </a:extLst>
                 </a:gridCol>
                 <a:gridCol w="1803043">
                   <a:extLst>
                     <a:ext uri="{9D8B030D-6E8A-4147-A177-3AD203B41FA5}">
-                      <a16:colId xmlns="" xmlns:a16="http://schemas.microsoft.com/office/drawing/2014/main" val="20001"/>
+                      <a16:colId xmlns:a16="http://schemas.microsoft.com/office/drawing/2014/main" xmlns="" val="20001"/>
                     </a:ext>
                   </a:extLst>
                 </a:gridCol>
                 <a:gridCol w="4488063">
                   <a:extLst>
                     <a:ext uri="{9D8B030D-6E8A-4147-A177-3AD203B41FA5}">
-                      <a16:colId xmlns="" xmlns:a16="http://schemas.microsoft.com/office/drawing/2014/main" val="20002"/>
+                      <a16:colId xmlns:a16="http://schemas.microsoft.com/office/drawing/2014/main" xmlns="" val="20002"/>
                     </a:ext>
                   </a:extLst>
                 </a:gridCol>
@@ -15904,7 +15904,7 @@
                 </a:tc>
                 <a:extLst>
                   <a:ext uri="{0D108BD9-81ED-4DB2-BD59-A6C34878D82A}">
-                    <a16:rowId xmlns="" xmlns:a16="http://schemas.microsoft.com/office/drawing/2014/main" val="10000"/>
+                    <a16:rowId xmlns:a16="http://schemas.microsoft.com/office/drawing/2014/main" xmlns="" val="10000"/>
                   </a:ext>
                 </a:extLst>
               </a:tr>
@@ -16020,7 +16020,7 @@
                 </a:tc>
                 <a:extLst>
                   <a:ext uri="{0D108BD9-81ED-4DB2-BD59-A6C34878D82A}">
-                    <a16:rowId xmlns="" xmlns:a16="http://schemas.microsoft.com/office/drawing/2014/main" val="10001"/>
+                    <a16:rowId xmlns:a16="http://schemas.microsoft.com/office/drawing/2014/main" xmlns="" val="10001"/>
                   </a:ext>
                 </a:extLst>
               </a:tr>
@@ -16206,7 +16206,7 @@
                 </a:tc>
                 <a:extLst>
                   <a:ext uri="{0D108BD9-81ED-4DB2-BD59-A6C34878D82A}">
-                    <a16:rowId xmlns="" xmlns:a16="http://schemas.microsoft.com/office/drawing/2014/main" val="10002"/>
+                    <a16:rowId xmlns:a16="http://schemas.microsoft.com/office/drawing/2014/main" xmlns="" val="10002"/>
                   </a:ext>
                 </a:extLst>
               </a:tr>
@@ -16388,7 +16388,7 @@
                 </a:tc>
                 <a:extLst>
                   <a:ext uri="{0D108BD9-81ED-4DB2-BD59-A6C34878D82A}">
-                    <a16:rowId xmlns="" xmlns:a16="http://schemas.microsoft.com/office/drawing/2014/main" val="10003"/>
+                    <a16:rowId xmlns:a16="http://schemas.microsoft.com/office/drawing/2014/main" xmlns="" val="10003"/>
                   </a:ext>
                 </a:extLst>
               </a:tr>
@@ -16530,7 +16530,7 @@
                 </a:tc>
                 <a:extLst>
                   <a:ext uri="{0D108BD9-81ED-4DB2-BD59-A6C34878D82A}">
-                    <a16:rowId xmlns="" xmlns:a16="http://schemas.microsoft.com/office/drawing/2014/main" val="10004"/>
+                    <a16:rowId xmlns:a16="http://schemas.microsoft.com/office/drawing/2014/main" xmlns="" val="10004"/>
                   </a:ext>
                 </a:extLst>
               </a:tr>
@@ -16643,7 +16643,7 @@
                 </a:tc>
                 <a:extLst>
                   <a:ext uri="{0D108BD9-81ED-4DB2-BD59-A6C34878D82A}">
-                    <a16:rowId xmlns="" xmlns:a16="http://schemas.microsoft.com/office/drawing/2014/main" val="10005"/>
+                    <a16:rowId xmlns:a16="http://schemas.microsoft.com/office/drawing/2014/main" xmlns="" val="10005"/>
                   </a:ext>
                 </a:extLst>
               </a:tr>
@@ -16807,7 +16807,7 @@
                 </a:tc>
                 <a:extLst>
                   <a:ext uri="{0D108BD9-81ED-4DB2-BD59-A6C34878D82A}">
-                    <a16:rowId xmlns="" xmlns:a16="http://schemas.microsoft.com/office/drawing/2014/main" val="10006"/>
+                    <a16:rowId xmlns:a16="http://schemas.microsoft.com/office/drawing/2014/main" xmlns="" val="10006"/>
                   </a:ext>
                 </a:extLst>
               </a:tr>
@@ -16964,7 +16964,7 @@
                 </a:tc>
                 <a:extLst>
                   <a:ext uri="{0D108BD9-81ED-4DB2-BD59-A6C34878D82A}">
-                    <a16:rowId xmlns="" xmlns:a16="http://schemas.microsoft.com/office/drawing/2014/main" val="10007"/>
+                    <a16:rowId xmlns:a16="http://schemas.microsoft.com/office/drawing/2014/main" xmlns="" val="10007"/>
                   </a:ext>
                 </a:extLst>
               </a:tr>
@@ -17020,160 +17020,7 @@
                 </a:tc>
                 <a:extLst>
                   <a:ext uri="{0D108BD9-81ED-4DB2-BD59-A6C34878D82A}">
-                    <a16:rowId xmlns="" xmlns:a16="http://schemas.microsoft.com/office/drawing/2014/main" val="10008"/>
-                  </a:ext>
-                </a:extLst>
-              </a:tr>
-              <a:tr h="468908">
-                <a:tc>
-                  <a:txBody>
-                    <a:bodyPr/>
-                    <a:lstStyle/>
-                    <a:p>
-                      <a:pPr marL="0" algn="ctr" defTabSz="685800" rtl="0" eaLnBrk="1" latinLnBrk="0" hangingPunct="1"/>
-                      <a:r>
-                        <a:rPr lang="en-US" altLang="zh-CN" sz="1100" b="1" kern="1200" baseline="0" dirty="0" err="1" smtClean="0">
-                          <a:solidFill>
-                            <a:schemeClr val="tx1"/>
-                          </a:solidFill>
-                          <a:latin typeface="微软雅黑" panose="020B0503020204020204" pitchFamily="34" charset="-122"/>
-                          <a:ea typeface="微软雅黑" panose="020B0503020204020204" pitchFamily="34" charset="-122"/>
-                          <a:cs typeface="+mn-cs"/>
-                        </a:rPr>
-                        <a:t>XiaoFeng</a:t>
-                      </a:r>
-                      <a:r>
-                        <a:rPr lang="en-US" altLang="zh-CN" sz="1100" b="1" kern="1200" baseline="0" dirty="0" smtClean="0">
-                          <a:solidFill>
-                            <a:schemeClr val="tx1"/>
-                          </a:solidFill>
-                          <a:latin typeface="微软雅黑" panose="020B0503020204020204" pitchFamily="34" charset="-122"/>
-                          <a:ea typeface="微软雅黑" panose="020B0503020204020204" pitchFamily="34" charset="-122"/>
-                          <a:cs typeface="+mn-cs"/>
-                        </a:rPr>
-                        <a:t> Wang(</a:t>
-                      </a:r>
-                      <a:r>
-                        <a:rPr lang="zh-CN" altLang="en-US" sz="1100" b="1" kern="1200" baseline="0" dirty="0" smtClean="0">
-                          <a:solidFill>
-                            <a:schemeClr val="tx1"/>
-                          </a:solidFill>
-                          <a:latin typeface="微软雅黑" panose="020B0503020204020204" pitchFamily="34" charset="-122"/>
-                          <a:ea typeface="微软雅黑" panose="020B0503020204020204" pitchFamily="34" charset="-122"/>
-                          <a:cs typeface="+mn-cs"/>
-                        </a:rPr>
-                        <a:t>王晓峰</a:t>
-                      </a:r>
-                      <a:r>
-                        <a:rPr lang="en-US" altLang="zh-CN" sz="1100" b="1" kern="1200" baseline="0" dirty="0" smtClean="0">
-                          <a:solidFill>
-                            <a:schemeClr val="tx1"/>
-                          </a:solidFill>
-                          <a:latin typeface="微软雅黑" panose="020B0503020204020204" pitchFamily="34" charset="-122"/>
-                          <a:ea typeface="微软雅黑" panose="020B0503020204020204" pitchFamily="34" charset="-122"/>
-                          <a:cs typeface="+mn-cs"/>
-                        </a:rPr>
-                        <a:t>)</a:t>
-                      </a:r>
-                      <a:endParaRPr lang="zh-CN" altLang="en-US" sz="1100" b="1" kern="1200" baseline="0" dirty="0">
-                        <a:solidFill>
-                          <a:schemeClr val="tx1"/>
-                        </a:solidFill>
-                        <a:latin typeface="微软雅黑" panose="020B0503020204020204" pitchFamily="34" charset="-122"/>
-                        <a:ea typeface="微软雅黑" panose="020B0503020204020204" pitchFamily="34" charset="-122"/>
-                        <a:cs typeface="+mn-cs"/>
-                      </a:endParaRPr>
-                    </a:p>
-                  </a:txBody>
-                  <a:tcPr marL="110604" marR="110604" marT="28714" marB="28714" anchor="ctr"/>
-                </a:tc>
-                <a:tc>
-                  <a:txBody>
-                    <a:bodyPr/>
-                    <a:lstStyle/>
-                    <a:p>
-                      <a:pPr marL="0" marR="0" lvl="0" indent="0" algn="ctr" defTabSz="914400" rtl="0" eaLnBrk="1" fontAlgn="auto" latinLnBrk="0" hangingPunct="1">
-                        <a:lnSpc>
-                          <a:spcPct val="100000"/>
-                        </a:lnSpc>
-                        <a:spcBef>
-                          <a:spcPts val="0"/>
-                        </a:spcBef>
-                        <a:spcAft>
-                          <a:spcPts val="0"/>
-                        </a:spcAft>
-                        <a:buClrTx/>
-                        <a:buSzTx/>
-                        <a:buFontTx/>
-                        <a:buNone/>
-                        <a:defRPr/>
-                      </a:pPr>
-                      <a:r>
-                        <a:rPr lang="en-US" altLang="zh-CN" sz="1100" b="1" kern="1200" baseline="0" dirty="0" smtClean="0">
-                          <a:solidFill>
-                            <a:schemeClr val="tx1"/>
-                          </a:solidFill>
-                          <a:latin typeface="微软雅黑" panose="020B0503020204020204" pitchFamily="34" charset="-122"/>
-                          <a:ea typeface="微软雅黑" panose="020B0503020204020204" pitchFamily="34" charset="-122"/>
-                          <a:cs typeface="+mn-cs"/>
-                        </a:rPr>
-                        <a:t>14:00-14:15</a:t>
-                      </a:r>
-                      <a:endParaRPr lang="zh-CN" altLang="en-US" sz="1100" b="1" kern="1200" baseline="0" dirty="0">
-                        <a:solidFill>
-                          <a:schemeClr val="tx1"/>
-                        </a:solidFill>
-                        <a:latin typeface="微软雅黑" panose="020B0503020204020204" pitchFamily="34" charset="-122"/>
-                        <a:ea typeface="微软雅黑" panose="020B0503020204020204" pitchFamily="34" charset="-122"/>
-                        <a:cs typeface="+mn-cs"/>
-                      </a:endParaRPr>
-                    </a:p>
-                  </a:txBody>
-                  <a:tcPr marL="110604" marR="110604" marT="28714" marB="28714" anchor="ctr"/>
-                </a:tc>
-                <a:tc>
-                  <a:txBody>
-                    <a:bodyPr/>
-                    <a:lstStyle/>
-                    <a:p>
-                      <a:pPr algn="ctr"/>
-                      <a:r>
-                        <a:rPr lang="en-US" altLang="zh-CN" sz="1100" b="1" kern="1200" baseline="0" dirty="0" smtClean="0">
-                          <a:solidFill>
-                            <a:schemeClr val="tx1"/>
-                          </a:solidFill>
-                          <a:latin typeface="微软雅黑" panose="020B0503020204020204" pitchFamily="34" charset="-122"/>
-                          <a:ea typeface="微软雅黑" panose="020B0503020204020204" pitchFamily="34" charset="-122"/>
-                          <a:cs typeface="+mn-cs"/>
-                        </a:rPr>
-                        <a:t>Advanced Photonics</a:t>
-                      </a:r>
-                      <a:r>
-                        <a:rPr lang="zh-CN" altLang="en-US" sz="1100" b="1" kern="1200" baseline="0" dirty="0" smtClean="0">
-                          <a:solidFill>
-                            <a:schemeClr val="tx1"/>
-                          </a:solidFill>
-                          <a:latin typeface="微软雅黑" panose="020B0503020204020204" pitchFamily="34" charset="-122"/>
-                          <a:ea typeface="微软雅黑" panose="020B0503020204020204" pitchFamily="34" charset="-122"/>
-                          <a:cs typeface="+mn-cs"/>
-                        </a:rPr>
-                        <a:t>杂志介绍</a:t>
-                      </a:r>
-                      <a:endParaRPr lang="zh-CN" altLang="en-US" sz="1100" b="1" kern="1200" baseline="0" dirty="0">
-                        <a:solidFill>
-                          <a:schemeClr val="tx1"/>
-                        </a:solidFill>
-                        <a:latin typeface="微软雅黑" panose="020B0503020204020204" pitchFamily="34" charset="-122"/>
-                        <a:ea typeface="微软雅黑" panose="020B0503020204020204" pitchFamily="34" charset="-122"/>
-                        <a:cs typeface="+mn-cs"/>
-                      </a:endParaRPr>
-                    </a:p>
-                  </a:txBody>
-                  <a:tcPr marL="110604" marR="110604" marT="28714" marB="28714" anchor="ctr"/>
-                </a:tc>
-                <a:extLst>
-                  <a:ext uri="{0D108BD9-81ED-4DB2-BD59-A6C34878D82A}">
-                    <a16:rowId xmlns="" xmlns:a16="http://schemas.microsoft.com/office/drawing/2014/main" val="10009"/>
+                    <a16:rowId xmlns:a16="http://schemas.microsoft.com/office/drawing/2014/main" xmlns="" val="10008"/>
                   </a:ext>
                 </a:extLst>
               </a:tr>
@@ -17264,17 +17111,17 @@
                       <a:r>
                         <a:rPr lang="en-US" altLang="zh-CN" sz="1100" b="1" kern="1200" baseline="0" dirty="0" smtClean="0">
                           <a:solidFill>
-                            <a:schemeClr val="dk1"/>
-                          </a:solidFill>
-                          <a:latin typeface="微软雅黑" panose="020B0503020204020204" pitchFamily="34" charset="-122"/>
-                          <a:ea typeface="微软雅黑" panose="020B0503020204020204" pitchFamily="34" charset="-122"/>
-                          <a:cs typeface="+mn-cs"/>
-                        </a:rPr>
-                        <a:t>14:15-14:40</a:t>
+                            <a:schemeClr val="tx1"/>
+                          </a:solidFill>
+                          <a:latin typeface="微软雅黑" panose="020B0503020204020204" pitchFamily="34" charset="-122"/>
+                          <a:ea typeface="微软雅黑" panose="020B0503020204020204" pitchFamily="34" charset="-122"/>
+                          <a:cs typeface="+mn-cs"/>
+                        </a:rPr>
+                        <a:t>14:00-14:25</a:t>
                       </a:r>
                       <a:endParaRPr lang="zh-CN" altLang="en-US" sz="1100" b="1" kern="1200" baseline="0" dirty="0" smtClean="0">
                         <a:solidFill>
-                          <a:schemeClr val="dk1"/>
+                          <a:schemeClr val="tx1"/>
                         </a:solidFill>
                         <a:latin typeface="微软雅黑" panose="020B0503020204020204" pitchFamily="34" charset="-122"/>
                         <a:ea typeface="微软雅黑" panose="020B0503020204020204" pitchFamily="34" charset="-122"/>
@@ -17334,7 +17181,7 @@
                         </a:rPr>
                         <a:t> polarization to atomic thickness</a:t>
                       </a:r>
-                      <a:endParaRPr lang="zh-CN" altLang="en-US" sz="1100" b="1" kern="1200" baseline="0" dirty="0">
+                      <a:endParaRPr lang="zh-CN" altLang="en-US" sz="1100" b="1" kern="1200" baseline="0" dirty="0" smtClean="0">
                         <a:solidFill>
                           <a:schemeClr val="dk1"/>
                         </a:solidFill>
@@ -17348,7 +17195,7 @@
                 </a:tc>
                 <a:extLst>
                   <a:ext uri="{0D108BD9-81ED-4DB2-BD59-A6C34878D82A}">
-                    <a16:rowId xmlns="" xmlns:a16="http://schemas.microsoft.com/office/drawing/2014/main" val="10010"/>
+                    <a16:rowId xmlns:a16="http://schemas.microsoft.com/office/drawing/2014/main" xmlns="" val="10009"/>
                   </a:ext>
                 </a:extLst>
               </a:tr>
@@ -17407,7 +17254,7 @@
                         </a:rPr>
                         <a:t>)</a:t>
                       </a:r>
-                      <a:endParaRPr lang="zh-CN" altLang="en-US" sz="1100" b="1" kern="1200" dirty="0">
+                      <a:endParaRPr lang="zh-CN" altLang="zh-CN" sz="1100" b="1" kern="1200" baseline="0" dirty="0" smtClean="0">
                         <a:solidFill>
                           <a:schemeClr val="tx1"/>
                         </a:solidFill>
@@ -17424,8 +17271,139 @@
                     <a:bodyPr/>
                     <a:lstStyle/>
                     <a:p>
+                      <a:pPr marL="0" marR="0" lvl="0" indent="0" algn="ctr" defTabSz="914400" rtl="0" eaLnBrk="1" fontAlgn="auto" latinLnBrk="0" hangingPunct="1">
+                        <a:lnSpc>
+                          <a:spcPct val="100000"/>
+                        </a:lnSpc>
+                        <a:spcBef>
+                          <a:spcPts val="0"/>
+                        </a:spcBef>
+                        <a:spcAft>
+                          <a:spcPts val="0"/>
+                        </a:spcAft>
+                        <a:buClrTx/>
+                        <a:buSzTx/>
+                        <a:buFontTx/>
+                        <a:buNone/>
+                        <a:defRPr/>
+                      </a:pPr>
+                      <a:r>
+                        <a:rPr lang="en-US" altLang="zh-CN" sz="1100" b="1" kern="1200" baseline="0" dirty="0" smtClean="0">
+                          <a:solidFill>
+                            <a:schemeClr val="dk1"/>
+                          </a:solidFill>
+                          <a:latin typeface="微软雅黑" panose="020B0503020204020204" pitchFamily="34" charset="-122"/>
+                          <a:ea typeface="微软雅黑" panose="020B0503020204020204" pitchFamily="34" charset="-122"/>
+                          <a:cs typeface="+mn-cs"/>
+                        </a:rPr>
+                        <a:t>14:25-14:50</a:t>
+                      </a:r>
+                      <a:endParaRPr lang="zh-CN" altLang="en-US" sz="1100" b="1" kern="1200" baseline="0" dirty="0" smtClean="0">
+                        <a:solidFill>
+                          <a:schemeClr val="dk1"/>
+                        </a:solidFill>
+                        <a:latin typeface="微软雅黑" panose="020B0503020204020204" pitchFamily="34" charset="-122"/>
+                        <a:ea typeface="微软雅黑" panose="020B0503020204020204" pitchFamily="34" charset="-122"/>
+                        <a:cs typeface="+mn-cs"/>
+                      </a:endParaRPr>
+                    </a:p>
+                  </a:txBody>
+                  <a:tcPr marL="110604" marR="110604" marT="28714" marB="28714" anchor="ctr"/>
+                </a:tc>
+                <a:tc>
+                  <a:txBody>
+                    <a:bodyPr/>
+                    <a:lstStyle/>
+                    <a:p>
                       <a:pPr algn="ctr"/>
                       <a:r>
+                        <a:rPr lang="en-US" altLang="zh-CN" sz="1100" b="1" kern="1200" dirty="0" smtClean="0">
+                          <a:solidFill>
+                            <a:schemeClr val="tx1"/>
+                          </a:solidFill>
+                          <a:latin typeface="微软雅黑" panose="020B0503020204020204" pitchFamily="34" charset="-122"/>
+                          <a:ea typeface="微软雅黑" panose="020B0503020204020204" pitchFamily="34" charset="-122"/>
+                          <a:cs typeface="+mn-cs"/>
+                        </a:rPr>
+                        <a:t>Singular optical beam multiplexing communication towards high performance computing applications </a:t>
+                      </a:r>
+                      <a:endParaRPr lang="zh-CN" altLang="en-US" sz="1100" b="1" kern="1200" baseline="0" dirty="0" smtClean="0">
+                        <a:solidFill>
+                          <a:schemeClr val="tx1"/>
+                        </a:solidFill>
+                        <a:latin typeface="微软雅黑" panose="020B0503020204020204" pitchFamily="34" charset="-122"/>
+                        <a:ea typeface="微软雅黑" panose="020B0503020204020204" pitchFamily="34" charset="-122"/>
+                        <a:cs typeface="+mn-cs"/>
+                      </a:endParaRPr>
+                    </a:p>
+                  </a:txBody>
+                  <a:tcPr marL="110604" marR="110604" marT="28714" marB="28714" anchor="ctr"/>
+                </a:tc>
+                <a:extLst>
+                  <a:ext uri="{0D108BD9-81ED-4DB2-BD59-A6C34878D82A}">
+                    <a16:rowId xmlns:a16="http://schemas.microsoft.com/office/drawing/2014/main" xmlns="" val="10010"/>
+                  </a:ext>
+                </a:extLst>
+              </a:tr>
+              <a:tr h="468908">
+                <a:tc>
+                  <a:txBody>
+                    <a:bodyPr/>
+                    <a:lstStyle/>
+                    <a:p>
+                      <a:pPr marL="0" algn="ctr" defTabSz="685800" rtl="0" eaLnBrk="1" latinLnBrk="0" hangingPunct="1"/>
+                      <a:r>
+                        <a:rPr lang="en-US" altLang="zh-CN" sz="1100" b="1" kern="1200" dirty="0" smtClean="0">
+                          <a:solidFill>
+                            <a:schemeClr val="dk1"/>
+                          </a:solidFill>
+                          <a:latin typeface="微软雅黑" panose="020B0503020204020204" pitchFamily="34" charset="-122"/>
+                          <a:ea typeface="微软雅黑" panose="020B0503020204020204" pitchFamily="34" charset="-122"/>
+                          <a:cs typeface="+mn-cs"/>
+                        </a:rPr>
+                        <a:t>Jack Ng(</a:t>
+                      </a:r>
+                      <a:r>
+                        <a:rPr lang="zh-CN" altLang="en-US" sz="1100" b="1" kern="1200" dirty="0" smtClean="0">
+                          <a:solidFill>
+                            <a:schemeClr val="dk1"/>
+                          </a:solidFill>
+                          <a:latin typeface="微软雅黑" panose="020B0503020204020204" pitchFamily="34" charset="-122"/>
+                          <a:ea typeface="微软雅黑" panose="020B0503020204020204" pitchFamily="34" charset="-122"/>
+                          <a:cs typeface="+mn-cs"/>
+                        </a:rPr>
+                        <a:t>吴紫辉</a:t>
+                      </a:r>
+                      <a:r>
+                        <a:rPr lang="en-US" altLang="zh-CN" sz="1100" b="1" kern="1200" dirty="0" smtClean="0">
+                          <a:solidFill>
+                            <a:schemeClr val="dk1"/>
+                          </a:solidFill>
+                          <a:latin typeface="微软雅黑" panose="020B0503020204020204" pitchFamily="34" charset="-122"/>
+                          <a:ea typeface="微软雅黑" panose="020B0503020204020204" pitchFamily="34" charset="-122"/>
+                          <a:cs typeface="+mn-cs"/>
+                        </a:rPr>
+                        <a:t>)</a:t>
+                      </a:r>
+                      <a:endParaRPr lang="zh-CN" altLang="en-US" sz="1100" b="1" kern="1200" dirty="0" smtClean="0">
+                        <a:solidFill>
+                          <a:schemeClr val="dk1"/>
+                        </a:solidFill>
+                        <a:latin typeface="微软雅黑" panose="020B0503020204020204" pitchFamily="34" charset="-122"/>
+                        <a:ea typeface="微软雅黑" panose="020B0503020204020204" pitchFamily="34" charset="-122"/>
+                        <a:cs typeface="+mn-cs"/>
+                      </a:endParaRPr>
+                    </a:p>
+                  </a:txBody>
+                  <a:tcPr marL="110604" marR="110604" marT="28714" marB="28714" anchor="ctr"/>
+                </a:tc>
+                <a:tc>
+                  <a:txBody>
+                    <a:bodyPr/>
+                    <a:lstStyle/>
+                    <a:p>
+                      <a:pPr algn="ctr"/>
+                      <a:r>
                         <a:rPr lang="en-US" altLang="zh-CN" sz="1100" b="1" kern="1200" baseline="0" dirty="0" smtClean="0">
                           <a:solidFill>
                             <a:schemeClr val="tx1"/>
@@ -17434,7 +17412,7 @@
                           <a:ea typeface="微软雅黑" panose="020B0503020204020204" pitchFamily="34" charset="-122"/>
                           <a:cs typeface="+mn-cs"/>
                         </a:rPr>
-                        <a:t>14:40-15:05</a:t>
+                        <a:t>14:50-15:15</a:t>
                       </a:r>
                       <a:endParaRPr lang="zh-CN" altLang="en-US" sz="1100" b="1" kern="1200" baseline="0" dirty="0">
                         <a:solidFill>
@@ -17457,17 +17435,17 @@
                       <a:r>
                         <a:rPr lang="en-US" altLang="zh-CN" sz="1100" b="1" kern="1200" dirty="0" smtClean="0">
                           <a:solidFill>
-                            <a:schemeClr val="tx1"/>
-                          </a:solidFill>
-                          <a:latin typeface="微软雅黑" panose="020B0503020204020204" pitchFamily="34" charset="-122"/>
-                          <a:ea typeface="微软雅黑" panose="020B0503020204020204" pitchFamily="34" charset="-122"/>
-                          <a:cs typeface="+mn-cs"/>
-                        </a:rPr>
-                        <a:t>Singular optical beam multiplexing communication towards high performance computing applications </a:t>
-                      </a:r>
-                      <a:endParaRPr lang="zh-CN" altLang="en-US" sz="1100" b="1" kern="1200" baseline="0" dirty="0">
+                            <a:schemeClr val="dk1"/>
+                          </a:solidFill>
+                          <a:latin typeface="微软雅黑" panose="020B0503020204020204" pitchFamily="34" charset="-122"/>
+                          <a:ea typeface="微软雅黑" panose="020B0503020204020204" pitchFamily="34" charset="-122"/>
+                          <a:cs typeface="+mn-cs"/>
+                        </a:rPr>
+                        <a:t>Optical Tractor Beam with Macroscopic Range</a:t>
+                      </a:r>
+                      <a:endParaRPr lang="zh-CN" altLang="en-US" sz="1100" b="1" kern="1200" dirty="0">
                         <a:solidFill>
-                          <a:schemeClr val="tx1"/>
+                          <a:schemeClr val="dk1"/>
                         </a:solidFill>
                         <a:latin typeface="微软雅黑" panose="020B0503020204020204" pitchFamily="34" charset="-122"/>
                         <a:ea typeface="微软雅黑" panose="020B0503020204020204" pitchFamily="34" charset="-122"/>
@@ -17479,7 +17457,7 @@
                 </a:tc>
                 <a:extLst>
                   <a:ext uri="{0D108BD9-81ED-4DB2-BD59-A6C34878D82A}">
-                    <a16:rowId xmlns="" xmlns:a16="http://schemas.microsoft.com/office/drawing/2014/main" val="10011"/>
+                    <a16:rowId xmlns:a16="http://schemas.microsoft.com/office/drawing/2014/main" xmlns="" val="10011"/>
                   </a:ext>
                 </a:extLst>
               </a:tr>
@@ -17750,7 +17728,7 @@
           <p:nvPr>
             <p:extLst>
               <p:ext uri="{D42A27DB-BD31-4B8C-83A1-F6EECF244321}">
-                <p14:modId xmlns:p14="http://schemas.microsoft.com/office/powerpoint/2010/main" val="3715760720"/>
+                <p14:modId xmlns:p14="http://schemas.microsoft.com/office/powerpoint/2010/main" val="3095265795"/>
               </p:ext>
             </p:extLst>
           </p:nvPr>
@@ -17769,21 +17747,21 @@
                 <a:gridCol w="2180823">
                   <a:extLst>
                     <a:ext uri="{9D8B030D-6E8A-4147-A177-3AD203B41FA5}">
-                      <a16:colId xmlns="" xmlns:a16="http://schemas.microsoft.com/office/drawing/2014/main" val="20000"/>
+                      <a16:colId xmlns:a16="http://schemas.microsoft.com/office/drawing/2014/main" xmlns="" val="20000"/>
                     </a:ext>
                   </a:extLst>
                 </a:gridCol>
                 <a:gridCol w="1803043">
                   <a:extLst>
                     <a:ext uri="{9D8B030D-6E8A-4147-A177-3AD203B41FA5}">
-                      <a16:colId xmlns="" xmlns:a16="http://schemas.microsoft.com/office/drawing/2014/main" val="20001"/>
+                      <a16:colId xmlns:a16="http://schemas.microsoft.com/office/drawing/2014/main" xmlns="" val="20001"/>
                     </a:ext>
                   </a:extLst>
                 </a:gridCol>
                 <a:gridCol w="4488063">
                   <a:extLst>
                     <a:ext uri="{9D8B030D-6E8A-4147-A177-3AD203B41FA5}">
-                      <a16:colId xmlns="" xmlns:a16="http://schemas.microsoft.com/office/drawing/2014/main" val="20002"/>
+                      <a16:colId xmlns:a16="http://schemas.microsoft.com/office/drawing/2014/main" xmlns="" val="20002"/>
                     </a:ext>
                   </a:extLst>
                 </a:gridCol>
@@ -17836,7 +17814,7 @@
                 </a:tc>
                 <a:extLst>
                   <a:ext uri="{0D108BD9-81ED-4DB2-BD59-A6C34878D82A}">
-                    <a16:rowId xmlns="" xmlns:a16="http://schemas.microsoft.com/office/drawing/2014/main" val="10000"/>
+                    <a16:rowId xmlns:a16="http://schemas.microsoft.com/office/drawing/2014/main" xmlns="" val="10000"/>
                   </a:ext>
                 </a:extLst>
               </a:tr>
@@ -17874,7 +17852,7 @@
                           <a:ea typeface="微软雅黑" panose="020B0503020204020204" pitchFamily="34" charset="-122"/>
                           <a:cs typeface="+mn-cs"/>
                         </a:rPr>
-                        <a:t>15:05-15:30</a:t>
+                        <a:t>15:15-15:40</a:t>
                       </a:r>
                       <a:endParaRPr lang="zh-CN" altLang="en-US" sz="1100" b="1" kern="1200" dirty="0">
                         <a:solidFill>
@@ -17920,7 +17898,7 @@
                         </a:rPr>
                         <a:t>Coffee  Break</a:t>
                       </a:r>
-                      <a:endParaRPr lang="zh-CN" altLang="en-US" sz="1100" b="1" kern="1200" dirty="0">
+                      <a:endParaRPr lang="zh-CN" altLang="en-US" sz="1100" b="1" kern="1200" dirty="0" smtClean="0">
                         <a:solidFill>
                           <a:schemeClr val="dk1"/>
                         </a:solidFill>
@@ -17934,7 +17912,7 @@
                 </a:tc>
                 <a:extLst>
                   <a:ext uri="{0D108BD9-81ED-4DB2-BD59-A6C34878D82A}">
-                    <a16:rowId xmlns="" xmlns:a16="http://schemas.microsoft.com/office/drawing/2014/main" val="10001"/>
+                    <a16:rowId xmlns:a16="http://schemas.microsoft.com/office/drawing/2014/main" xmlns="" val="10001"/>
                   </a:ext>
                 </a:extLst>
               </a:tr>
@@ -17946,6 +17924,17 @@
                     <a:p>
                       <a:pPr marL="0" algn="ctr" defTabSz="685800" rtl="0" eaLnBrk="1" latinLnBrk="0" hangingPunct="1"/>
                       <a:r>
+                        <a:rPr lang="en-US" altLang="zh-CN" sz="1100" b="1" kern="1200" dirty="0" err="1" smtClean="0">
+                          <a:solidFill>
+                            <a:schemeClr val="dk1"/>
+                          </a:solidFill>
+                          <a:latin typeface="微软雅黑" panose="020B0503020204020204" pitchFamily="34" charset="-122"/>
+                          <a:ea typeface="微软雅黑" panose="020B0503020204020204" pitchFamily="34" charset="-122"/>
+                          <a:cs typeface="+mn-cs"/>
+                        </a:rPr>
+                        <a:t>YaoYu</a:t>
+                      </a:r>
+                      <a:r>
                         <a:rPr lang="en-US" altLang="zh-CN" sz="1100" b="1" kern="1200" dirty="0" smtClean="0">
                           <a:solidFill>
                             <a:schemeClr val="dk1"/>
@@ -17954,7 +17943,7 @@
                           <a:ea typeface="微软雅黑" panose="020B0503020204020204" pitchFamily="34" charset="-122"/>
                           <a:cs typeface="+mn-cs"/>
                         </a:rPr>
-                        <a:t>Jack Ng(</a:t>
+                        <a:t>  Cao(</a:t>
                       </a:r>
                       <a:r>
                         <a:rPr lang="zh-CN" altLang="en-US" sz="1100" b="1" kern="1200" dirty="0" smtClean="0">
@@ -17965,7 +17954,7 @@
                           <a:ea typeface="微软雅黑" panose="020B0503020204020204" pitchFamily="34" charset="-122"/>
                           <a:cs typeface="+mn-cs"/>
                         </a:rPr>
-                        <a:t>吴紫辉</a:t>
+                        <a:t>曹耀宇</a:t>
                       </a:r>
                       <a:r>
                         <a:rPr lang="en-US" altLang="zh-CN" sz="1100" b="1" kern="1200" dirty="0" smtClean="0">
@@ -18005,134 +17994,7 @@
                           <a:ea typeface="微软雅黑" panose="020B0503020204020204" pitchFamily="34" charset="-122"/>
                           <a:cs typeface="+mn-cs"/>
                         </a:rPr>
-                        <a:t>15:30-15:55</a:t>
-                      </a:r>
-                      <a:endParaRPr lang="zh-CN" altLang="en-US" sz="1100" b="1" kern="1200" dirty="0">
-                        <a:solidFill>
-                          <a:schemeClr val="dk1"/>
-                        </a:solidFill>
-                        <a:latin typeface="微软雅黑" panose="020B0503020204020204" pitchFamily="34" charset="-122"/>
-                        <a:ea typeface="微软雅黑" panose="020B0503020204020204" pitchFamily="34" charset="-122"/>
-                        <a:cs typeface="+mn-cs"/>
-                      </a:endParaRPr>
-                    </a:p>
-                  </a:txBody>
-                  <a:tcPr marL="110604" marR="110604" marT="28714" marB="28714" anchor="ctr"/>
-                </a:tc>
-                <a:tc>
-                  <a:txBody>
-                    <a:bodyPr/>
-                    <a:lstStyle/>
-                    <a:p>
-                      <a:pPr algn="ctr"/>
-                      <a:r>
-                        <a:rPr lang="en-US" altLang="zh-CN" sz="1100" b="1" kern="1200" dirty="0" smtClean="0">
-                          <a:solidFill>
-                            <a:schemeClr val="dk1"/>
-                          </a:solidFill>
-                          <a:latin typeface="微软雅黑" panose="020B0503020204020204" pitchFamily="34" charset="-122"/>
-                          <a:ea typeface="微软雅黑" panose="020B0503020204020204" pitchFamily="34" charset="-122"/>
-                          <a:cs typeface="+mn-cs"/>
-                        </a:rPr>
-                        <a:t>Optical Tractor Beam with Macroscopic Range</a:t>
-                      </a:r>
-                      <a:endParaRPr lang="zh-CN" altLang="en-US" sz="1100" b="1" kern="1200" dirty="0">
-                        <a:solidFill>
-                          <a:schemeClr val="dk1"/>
-                        </a:solidFill>
-                        <a:latin typeface="微软雅黑" panose="020B0503020204020204" pitchFamily="34" charset="-122"/>
-                        <a:ea typeface="微软雅黑" panose="020B0503020204020204" pitchFamily="34" charset="-122"/>
-                        <a:cs typeface="+mn-cs"/>
-                      </a:endParaRPr>
-                    </a:p>
-                  </a:txBody>
-                  <a:tcPr marL="110604" marR="110604" marT="28714" marB="28714" anchor="ctr"/>
-                </a:tc>
-                <a:extLst>
-                  <a:ext uri="{0D108BD9-81ED-4DB2-BD59-A6C34878D82A}">
-                    <a16:rowId xmlns="" xmlns:a16="http://schemas.microsoft.com/office/drawing/2014/main" val="10002"/>
-                  </a:ext>
-                </a:extLst>
-              </a:tr>
-              <a:tr h="475962">
-                <a:tc>
-                  <a:txBody>
-                    <a:bodyPr/>
-                    <a:lstStyle/>
-                    <a:p>
-                      <a:pPr marL="0" algn="ctr" defTabSz="685800" rtl="0" eaLnBrk="1" latinLnBrk="0" hangingPunct="1"/>
-                      <a:r>
-                        <a:rPr lang="en-US" altLang="zh-CN" sz="1100" b="1" kern="1200" dirty="0" err="1" smtClean="0">
-                          <a:solidFill>
-                            <a:schemeClr val="dk1"/>
-                          </a:solidFill>
-                          <a:latin typeface="微软雅黑" panose="020B0503020204020204" pitchFamily="34" charset="-122"/>
-                          <a:ea typeface="微软雅黑" panose="020B0503020204020204" pitchFamily="34" charset="-122"/>
-                          <a:cs typeface="+mn-cs"/>
-                        </a:rPr>
-                        <a:t>YaoYu</a:t>
-                      </a:r>
-                      <a:r>
-                        <a:rPr lang="en-US" altLang="zh-CN" sz="1100" b="1" kern="1200" dirty="0" smtClean="0">
-                          <a:solidFill>
-                            <a:schemeClr val="dk1"/>
-                          </a:solidFill>
-                          <a:latin typeface="微软雅黑" panose="020B0503020204020204" pitchFamily="34" charset="-122"/>
-                          <a:ea typeface="微软雅黑" panose="020B0503020204020204" pitchFamily="34" charset="-122"/>
-                          <a:cs typeface="+mn-cs"/>
-                        </a:rPr>
-                        <a:t>  Cao(</a:t>
-                      </a:r>
-                      <a:r>
-                        <a:rPr lang="zh-CN" altLang="en-US" sz="1100" b="1" kern="1200" dirty="0" smtClean="0">
-                          <a:solidFill>
-                            <a:schemeClr val="dk1"/>
-                          </a:solidFill>
-                          <a:latin typeface="微软雅黑" panose="020B0503020204020204" pitchFamily="34" charset="-122"/>
-                          <a:ea typeface="微软雅黑" panose="020B0503020204020204" pitchFamily="34" charset="-122"/>
-                          <a:cs typeface="+mn-cs"/>
-                        </a:rPr>
-                        <a:t>曹耀宇</a:t>
-                      </a:r>
-                      <a:r>
-                        <a:rPr lang="en-US" altLang="zh-CN" sz="1100" b="1" kern="1200" dirty="0" smtClean="0">
-                          <a:solidFill>
-                            <a:schemeClr val="dk1"/>
-                          </a:solidFill>
-                          <a:latin typeface="微软雅黑" panose="020B0503020204020204" pitchFamily="34" charset="-122"/>
-                          <a:ea typeface="微软雅黑" panose="020B0503020204020204" pitchFamily="34" charset="-122"/>
-                          <a:cs typeface="+mn-cs"/>
-                        </a:rPr>
-                        <a:t>)</a:t>
-                      </a:r>
-                      <a:endParaRPr lang="zh-CN" altLang="en-US" sz="1100" b="1" kern="1200" dirty="0">
-                        <a:solidFill>
-                          <a:schemeClr val="dk1"/>
-                        </a:solidFill>
-                        <a:latin typeface="微软雅黑" panose="020B0503020204020204" pitchFamily="34" charset="-122"/>
-                        <a:ea typeface="微软雅黑" panose="020B0503020204020204" pitchFamily="34" charset="-122"/>
-                        <a:cs typeface="+mn-cs"/>
-                      </a:endParaRPr>
-                    </a:p>
-                  </a:txBody>
-                  <a:tcPr marL="110604" marR="110604" marT="28714" marB="28714" anchor="ctr"/>
-                </a:tc>
-                <a:tc>
-                  <a:txBody>
-                    <a:bodyPr/>
-                    <a:lstStyle/>
-                    <a:p>
-                      <a:pPr marL="0" algn="ctr" defTabSz="685800" rtl="0" eaLnBrk="1" latinLnBrk="0" hangingPunct="1"/>
-                      <a:r>
-                        <a:rPr lang="en-US" altLang="zh-CN" sz="1100" b="1" kern="1200" dirty="0" smtClean="0">
-                          <a:solidFill>
-                            <a:schemeClr val="dk1"/>
-                          </a:solidFill>
-                          <a:latin typeface="微软雅黑" panose="020B0503020204020204" pitchFamily="34" charset="-122"/>
-                          <a:ea typeface="微软雅黑" panose="020B0503020204020204" pitchFamily="34" charset="-122"/>
-                          <a:cs typeface="+mn-cs"/>
-                        </a:rPr>
-                        <a:t>15:55-16:20</a:t>
+                        <a:t>15:40-16:05</a:t>
                       </a:r>
                       <a:endParaRPr lang="zh-CN" altLang="en-US" sz="1100" b="1" kern="1200" dirty="0">
                         <a:solidFill>
@@ -18200,7 +18062,7 @@
                         </a:rPr>
                         <a:t>: new challenges and opportunities</a:t>
                       </a:r>
-                      <a:endParaRPr lang="zh-CN" altLang="en-US" sz="1100" b="1" kern="1200" dirty="0">
+                      <a:endParaRPr lang="zh-CN" altLang="en-US" sz="1100" b="1" kern="1200" dirty="0" smtClean="0">
                         <a:solidFill>
                           <a:schemeClr val="dk1"/>
                         </a:solidFill>
@@ -18214,11 +18076,11 @@
                 </a:tc>
                 <a:extLst>
                   <a:ext uri="{0D108BD9-81ED-4DB2-BD59-A6C34878D82A}">
-                    <a16:rowId xmlns="" xmlns:a16="http://schemas.microsoft.com/office/drawing/2014/main" val="10003"/>
+                    <a16:rowId xmlns:a16="http://schemas.microsoft.com/office/drawing/2014/main" xmlns="" val="10002"/>
                   </a:ext>
                 </a:extLst>
               </a:tr>
-              <a:tr h="331748">
+              <a:tr h="475962">
                 <a:tc>
                   <a:txBody>
                     <a:bodyPr/>
@@ -18285,7 +18147,7 @@
                           <a:ea typeface="微软雅黑" panose="020B0503020204020204" pitchFamily="34" charset="-122"/>
                           <a:cs typeface="+mn-cs"/>
                         </a:rPr>
-                        <a:t>16:20-16:45</a:t>
+                        <a:t>16:05-16:30</a:t>
                       </a:r>
                       <a:endParaRPr lang="zh-CN" altLang="en-US" sz="1100" b="1" kern="1200" dirty="0">
                         <a:solidFill>
@@ -18304,7 +18166,6 @@
                     <a:bodyPr/>
                     <a:lstStyle/>
                     <a:p>
-                      <a:pPr algn="ctr"/>
                       <a:r>
                         <a:rPr lang="en-US" altLang="en-US" sz="1100" b="1" kern="1200" dirty="0" err="1" smtClean="0">
                           <a:solidFill>
@@ -18371,7 +18232,7 @@
                         </a:rPr>
                         <a:t> modulation with incident polarization </a:t>
                       </a:r>
-                      <a:endParaRPr lang="zh-CN" altLang="en-US" sz="1100" b="1" kern="1200" dirty="0">
+                      <a:endParaRPr lang="zh-CN" altLang="en-US" sz="1100" b="1" kern="1200" dirty="0" smtClean="0">
                         <a:solidFill>
                           <a:schemeClr val="dk1"/>
                         </a:solidFill>
@@ -18385,11 +18246,11 @@
                 </a:tc>
                 <a:extLst>
                   <a:ext uri="{0D108BD9-81ED-4DB2-BD59-A6C34878D82A}">
-                    <a16:rowId xmlns="" xmlns:a16="http://schemas.microsoft.com/office/drawing/2014/main" val="10004"/>
+                    <a16:rowId xmlns:a16="http://schemas.microsoft.com/office/drawing/2014/main" xmlns="" val="10003"/>
                   </a:ext>
                 </a:extLst>
               </a:tr>
-              <a:tr h="291582">
+              <a:tr h="331748">
                 <a:tc>
                   <a:txBody>
                     <a:bodyPr/>
@@ -18397,42 +18258,64 @@
                     <a:p>
                       <a:pPr marL="0" algn="ctr" defTabSz="685800" rtl="0" eaLnBrk="1" latinLnBrk="0" hangingPunct="1"/>
                       <a:r>
-                        <a:rPr lang="en-US" altLang="zh-CN" sz="1100" b="1" kern="1200" dirty="0" err="1" smtClean="0">
-                          <a:solidFill>
-                            <a:schemeClr val="dk1"/>
-                          </a:solidFill>
-                          <a:latin typeface="微软雅黑" panose="020B0503020204020204" pitchFamily="34" charset="-122"/>
-                          <a:ea typeface="微软雅黑" panose="020B0503020204020204" pitchFamily="34" charset="-122"/>
-                          <a:cs typeface="+mn-cs"/>
-                        </a:rPr>
-                        <a:t>GuiXin</a:t>
+                        <a:rPr lang="en-US" altLang="en-US" sz="1100" b="1" kern="1200" dirty="0" smtClean="0">
+                          <a:solidFill>
+                            <a:schemeClr val="tx1"/>
+                          </a:solidFill>
+                          <a:latin typeface="微软雅黑" panose="020B0503020204020204" pitchFamily="34" charset="-122"/>
+                          <a:ea typeface="微软雅黑" panose="020B0503020204020204" pitchFamily="34" charset="-122"/>
+                          <a:cs typeface="+mn-cs"/>
+                        </a:rPr>
+                        <a:t>LI Jensen </a:t>
+                      </a:r>
+                      <a:r>
+                        <a:rPr lang="en-US" altLang="en-US" sz="1100" b="1" kern="1200" dirty="0" err="1" smtClean="0">
+                          <a:solidFill>
+                            <a:schemeClr val="tx1"/>
+                          </a:solidFill>
+                          <a:latin typeface="微软雅黑" panose="020B0503020204020204" pitchFamily="34" charset="-122"/>
+                          <a:ea typeface="微软雅黑" panose="020B0503020204020204" pitchFamily="34" charset="-122"/>
+                          <a:cs typeface="+mn-cs"/>
+                        </a:rPr>
+                        <a:t>Tsan</a:t>
+                      </a:r>
+                      <a:r>
+                        <a:rPr lang="en-US" altLang="en-US" sz="1100" b="1" kern="1200" dirty="0" smtClean="0">
+                          <a:solidFill>
+                            <a:schemeClr val="tx1"/>
+                          </a:solidFill>
+                          <a:latin typeface="微软雅黑" panose="020B0503020204020204" pitchFamily="34" charset="-122"/>
+                          <a:ea typeface="微软雅黑" panose="020B0503020204020204" pitchFamily="34" charset="-122"/>
+                          <a:cs typeface="+mn-cs"/>
+                        </a:rPr>
+                        <a:t> Hang</a:t>
                       </a:r>
                       <a:r>
                         <a:rPr lang="en-US" altLang="zh-CN" sz="1100" b="1" kern="1200" dirty="0" smtClean="0">
                           <a:solidFill>
-                            <a:schemeClr val="dk1"/>
-                          </a:solidFill>
-                          <a:latin typeface="微软雅黑" panose="020B0503020204020204" pitchFamily="34" charset="-122"/>
-                          <a:ea typeface="微软雅黑" panose="020B0503020204020204" pitchFamily="34" charset="-122"/>
-                          <a:cs typeface="+mn-cs"/>
-                        </a:rPr>
-                        <a:t>  Li (</a:t>
+                            <a:schemeClr val="tx1"/>
+                          </a:solidFill>
+                          <a:latin typeface="微软雅黑" panose="020B0503020204020204" pitchFamily="34" charset="-122"/>
+                          <a:ea typeface="微软雅黑" panose="020B0503020204020204" pitchFamily="34" charset="-122"/>
+                          <a:cs typeface="+mn-cs"/>
+                        </a:rPr>
+                        <a:t>(</a:t>
                       </a:r>
                       <a:r>
                         <a:rPr lang="zh-CN" altLang="en-US" sz="1100" b="1" kern="1200" dirty="0" smtClean="0">
                           <a:solidFill>
-                            <a:schemeClr val="dk1"/>
-                          </a:solidFill>
-                          <a:latin typeface="微软雅黑" panose="020B0503020204020204" pitchFamily="34" charset="-122"/>
-                          <a:ea typeface="微软雅黑" panose="020B0503020204020204" pitchFamily="34" charset="-122"/>
-                          <a:cs typeface="+mn-cs"/>
-                        </a:rPr>
-                        <a:t>李贵新</a:t>
+                            <a:schemeClr val="tx1"/>
+                          </a:solidFill>
+                          <a:latin typeface="微软雅黑" panose="020B0503020204020204" pitchFamily="34" charset="-122"/>
+                          <a:ea typeface="微软雅黑" panose="020B0503020204020204" pitchFamily="34" charset="-122"/>
+                          <a:cs typeface="+mn-cs"/>
+                        </a:rPr>
+                        <a:t>李赞恒</a:t>
                       </a:r>
                       <a:r>
                         <a:rPr lang="en-US" altLang="zh-CN" sz="1100" b="1" kern="1200" dirty="0" smtClean="0">
                           <a:solidFill>
-                            <a:schemeClr val="dk1"/>
+                            <a:schemeClr val="tx1"/>
                           </a:solidFill>
                           <a:latin typeface="微软雅黑" panose="020B0503020204020204" pitchFamily="34" charset="-122"/>
                           <a:ea typeface="微软雅黑" panose="020B0503020204020204" pitchFamily="34" charset="-122"/>
@@ -18440,6 +18323,25 @@
                         </a:rPr>
                         <a:t>)</a:t>
                       </a:r>
+                      <a:r>
+                        <a:rPr lang="en-US" altLang="zh-CN" sz="1100" b="1" kern="1200" baseline="0" dirty="0" smtClean="0">
+                          <a:solidFill>
+                            <a:schemeClr val="tx1"/>
+                          </a:solidFill>
+                          <a:latin typeface="微软雅黑" panose="020B0503020204020204" pitchFamily="34" charset="-122"/>
+                          <a:ea typeface="微软雅黑" panose="020B0503020204020204" pitchFamily="34" charset="-122"/>
+                          <a:cs typeface="+mn-cs"/>
+                        </a:rPr>
+                        <a:t> </a:t>
+                      </a:r>
+                      <a:endParaRPr lang="zh-CN" altLang="en-US" sz="1100" b="1" kern="1200" dirty="0">
+                        <a:solidFill>
+                          <a:schemeClr val="tx1"/>
+                        </a:solidFill>
+                        <a:latin typeface="微软雅黑" panose="020B0503020204020204" pitchFamily="34" charset="-122"/>
+                        <a:ea typeface="微软雅黑" panose="020B0503020204020204" pitchFamily="34" charset="-122"/>
+                        <a:cs typeface="+mn-cs"/>
+                      </a:endParaRPr>
                     </a:p>
                   </a:txBody>
                   <a:tcPr marL="110604" marR="110604" marT="28714" marB="28714" anchor="ctr"/>
@@ -18459,7 +18361,7 @@
                           <a:ea typeface="微软雅黑" panose="020B0503020204020204" pitchFamily="34" charset="-122"/>
                           <a:cs typeface="+mn-cs"/>
                         </a:rPr>
-                        <a:t>16:45-17:10</a:t>
+                        <a:t>16:30-16:45</a:t>
                       </a:r>
                       <a:endParaRPr lang="zh-CN" altLang="en-US" sz="1100" b="1" kern="1200" dirty="0">
                         <a:solidFill>
@@ -18488,6 +18390,136 @@
                           <a:ea typeface="微软雅黑" panose="020B0503020204020204" pitchFamily="34" charset="-122"/>
                           <a:cs typeface="+mn-cs"/>
                         </a:rPr>
+                        <a:t>Elastic </a:t>
+                      </a:r>
+                      <a:r>
+                        <a:rPr lang="en-US" altLang="zh-CN" sz="1100" b="1" kern="1200" dirty="0" err="1" smtClean="0">
+                          <a:solidFill>
+                            <a:schemeClr val="dk1"/>
+                          </a:solidFill>
+                          <a:latin typeface="微软雅黑" panose="020B0503020204020204" pitchFamily="34" charset="-122"/>
+                          <a:ea typeface="微软雅黑" panose="020B0503020204020204" pitchFamily="34" charset="-122"/>
+                          <a:cs typeface="+mn-cs"/>
+                        </a:rPr>
+                        <a:t>metasurfaces</a:t>
+                      </a:r>
+                      <a:endParaRPr lang="en-US" altLang="zh-CN" sz="1100" b="1" kern="1200" dirty="0" smtClean="0">
+                        <a:solidFill>
+                          <a:schemeClr val="dk1"/>
+                        </a:solidFill>
+                        <a:latin typeface="微软雅黑" panose="020B0503020204020204" pitchFamily="34" charset="-122"/>
+                        <a:ea typeface="微软雅黑" panose="020B0503020204020204" pitchFamily="34" charset="-122"/>
+                        <a:cs typeface="+mn-cs"/>
+                      </a:endParaRPr>
+                    </a:p>
+                  </a:txBody>
+                  <a:tcPr marL="110604" marR="110604" marT="28714" marB="28714" anchor="ctr"/>
+                </a:tc>
+                <a:extLst>
+                  <a:ext uri="{0D108BD9-81ED-4DB2-BD59-A6C34878D82A}">
+                    <a16:rowId xmlns:a16="http://schemas.microsoft.com/office/drawing/2014/main" xmlns="" val="10004"/>
+                  </a:ext>
+                </a:extLst>
+              </a:tr>
+              <a:tr h="291582">
+                <a:tc>
+                  <a:txBody>
+                    <a:bodyPr/>
+                    <a:lstStyle/>
+                    <a:p>
+                      <a:pPr marL="0" algn="ctr" defTabSz="685800" rtl="0" eaLnBrk="1" latinLnBrk="0" hangingPunct="1"/>
+                      <a:r>
+                        <a:rPr lang="en-US" altLang="zh-CN" sz="1100" b="1" kern="1200" dirty="0" err="1" smtClean="0">
+                          <a:solidFill>
+                            <a:schemeClr val="dk1"/>
+                          </a:solidFill>
+                          <a:latin typeface="微软雅黑" panose="020B0503020204020204" pitchFamily="34" charset="-122"/>
+                          <a:ea typeface="微软雅黑" panose="020B0503020204020204" pitchFamily="34" charset="-122"/>
+                          <a:cs typeface="+mn-cs"/>
+                        </a:rPr>
+                        <a:t>GuiXin</a:t>
+                      </a:r>
+                      <a:r>
+                        <a:rPr lang="en-US" altLang="zh-CN" sz="1100" b="1" kern="1200" dirty="0" smtClean="0">
+                          <a:solidFill>
+                            <a:schemeClr val="dk1"/>
+                          </a:solidFill>
+                          <a:latin typeface="微软雅黑" panose="020B0503020204020204" pitchFamily="34" charset="-122"/>
+                          <a:ea typeface="微软雅黑" panose="020B0503020204020204" pitchFamily="34" charset="-122"/>
+                          <a:cs typeface="+mn-cs"/>
+                        </a:rPr>
+                        <a:t>  Li (</a:t>
+                      </a:r>
+                      <a:r>
+                        <a:rPr lang="zh-CN" altLang="en-US" sz="1100" b="1" kern="1200" dirty="0" smtClean="0">
+                          <a:solidFill>
+                            <a:schemeClr val="dk1"/>
+                          </a:solidFill>
+                          <a:latin typeface="微软雅黑" panose="020B0503020204020204" pitchFamily="34" charset="-122"/>
+                          <a:ea typeface="微软雅黑" panose="020B0503020204020204" pitchFamily="34" charset="-122"/>
+                          <a:cs typeface="+mn-cs"/>
+                        </a:rPr>
+                        <a:t>李贵新</a:t>
+                      </a:r>
+                      <a:r>
+                        <a:rPr lang="en-US" altLang="zh-CN" sz="1100" b="1" kern="1200" dirty="0" smtClean="0">
+                          <a:solidFill>
+                            <a:schemeClr val="dk1"/>
+                          </a:solidFill>
+                          <a:latin typeface="微软雅黑" panose="020B0503020204020204" pitchFamily="34" charset="-122"/>
+                          <a:ea typeface="微软雅黑" panose="020B0503020204020204" pitchFamily="34" charset="-122"/>
+                          <a:cs typeface="+mn-cs"/>
+                        </a:rPr>
+                        <a:t>)</a:t>
+                      </a:r>
+                    </a:p>
+                  </a:txBody>
+                  <a:tcPr marL="110604" marR="110604" marT="28714" marB="28714" anchor="ctr"/>
+                </a:tc>
+                <a:tc>
+                  <a:txBody>
+                    <a:bodyPr/>
+                    <a:lstStyle/>
+                    <a:p>
+                      <a:pPr marL="0" algn="ctr" defTabSz="685800" rtl="0" eaLnBrk="1" latinLnBrk="0" hangingPunct="1"/>
+                      <a:r>
+                        <a:rPr lang="en-US" altLang="zh-CN" sz="1100" b="1" kern="1200" dirty="0" smtClean="0">
+                          <a:solidFill>
+                            <a:schemeClr val="dk1"/>
+                          </a:solidFill>
+                          <a:latin typeface="微软雅黑" panose="020B0503020204020204" pitchFamily="34" charset="-122"/>
+                          <a:ea typeface="微软雅黑" panose="020B0503020204020204" pitchFamily="34" charset="-122"/>
+                          <a:cs typeface="+mn-cs"/>
+                        </a:rPr>
+                        <a:t>16:45-17:00</a:t>
+                      </a:r>
+                      <a:endParaRPr lang="zh-CN" altLang="en-US" sz="1100" b="1" kern="1200" dirty="0">
+                        <a:solidFill>
+                          <a:schemeClr val="dk1"/>
+                        </a:solidFill>
+                        <a:latin typeface="微软雅黑" panose="020B0503020204020204" pitchFamily="34" charset="-122"/>
+                        <a:ea typeface="微软雅黑" panose="020B0503020204020204" pitchFamily="34" charset="-122"/>
+                        <a:cs typeface="+mn-cs"/>
+                      </a:endParaRPr>
+                    </a:p>
+                  </a:txBody>
+                  <a:tcPr marL="110604" marR="110604" marT="28714" marB="28714" anchor="ctr"/>
+                </a:tc>
+                <a:tc>
+                  <a:txBody>
+                    <a:bodyPr/>
+                    <a:lstStyle/>
+                    <a:p>
+                      <a:pPr marL="0" algn="ctr" defTabSz="685800" rtl="0" eaLnBrk="1" latinLnBrk="0" hangingPunct="1"/>
+                      <a:r>
+                        <a:rPr lang="en-US" altLang="zh-CN" sz="1100" b="1" kern="1200" dirty="0" smtClean="0">
+                          <a:solidFill>
+                            <a:schemeClr val="dk1"/>
+                          </a:solidFill>
+                          <a:latin typeface="微软雅黑" panose="020B0503020204020204" pitchFamily="34" charset="-122"/>
+                          <a:ea typeface="微软雅黑" panose="020B0503020204020204" pitchFamily="34" charset="-122"/>
+                          <a:cs typeface="+mn-cs"/>
+                        </a:rPr>
                         <a:t>Nonlinear Photonic </a:t>
                       </a:r>
                       <a:r>
@@ -18515,7 +18547,7 @@
                 </a:tc>
                 <a:extLst>
                   <a:ext uri="{0D108BD9-81ED-4DB2-BD59-A6C34878D82A}">
-                    <a16:rowId xmlns="" xmlns:a16="http://schemas.microsoft.com/office/drawing/2014/main" val="10005"/>
+                    <a16:rowId xmlns:a16="http://schemas.microsoft.com/office/drawing/2014/main" xmlns="" val="10005"/>
                   </a:ext>
                 </a:extLst>
               </a:tr>
@@ -19128,7 +19160,7 @@
           <p:cNvPr id="12" name="矩形 11">
             <a:extLst>
               <a:ext uri="{FF2B5EF4-FFF2-40B4-BE49-F238E27FC236}">
-                <a16:creationId xmlns:a16="http://schemas.microsoft.com/office/drawing/2014/main" xmlns="" id="{42B28CF3-1023-471A-85FC-9F9F3ADC12F8}"/>
+                <a16:creationId xmlns="" xmlns:a16="http://schemas.microsoft.com/office/drawing/2014/main" id="{42B28CF3-1023-471A-85FC-9F9F3ADC12F8}"/>
               </a:ext>
             </a:extLst>
           </p:cNvPr>
@@ -19194,7 +19226,7 @@
           <p:cNvPr id="8" name="表格 7">
             <a:extLst>
               <a:ext uri="{FF2B5EF4-FFF2-40B4-BE49-F238E27FC236}">
-                <a16:creationId xmlns:a16="http://schemas.microsoft.com/office/drawing/2014/main" xmlns="" id="{DF1018AF-4BB1-46F7-91DD-90F84352DBBF}"/>
+                <a16:creationId xmlns="" xmlns:a16="http://schemas.microsoft.com/office/drawing/2014/main" id="{DF1018AF-4BB1-46F7-91DD-90F84352DBBF}"/>
               </a:ext>
             </a:extLst>
           </p:cNvPr>
@@ -19223,21 +19255,21 @@
                 <a:gridCol w="2180823">
                   <a:extLst>
                     <a:ext uri="{9D8B030D-6E8A-4147-A177-3AD203B41FA5}">
-                      <a16:colId xmlns:a16="http://schemas.microsoft.com/office/drawing/2014/main" xmlns="" val="271949209"/>
+                      <a16:colId xmlns="" xmlns:a16="http://schemas.microsoft.com/office/drawing/2014/main" val="271949209"/>
                     </a:ext>
                   </a:extLst>
                 </a:gridCol>
                 <a:gridCol w="1940417">
                   <a:extLst>
                     <a:ext uri="{9D8B030D-6E8A-4147-A177-3AD203B41FA5}">
-                      <a16:colId xmlns:a16="http://schemas.microsoft.com/office/drawing/2014/main" xmlns="" val="483794282"/>
+                      <a16:colId xmlns="" xmlns:a16="http://schemas.microsoft.com/office/drawing/2014/main" val="483794282"/>
                     </a:ext>
                   </a:extLst>
                 </a:gridCol>
                 <a:gridCol w="4350688">
                   <a:extLst>
                     <a:ext uri="{9D8B030D-6E8A-4147-A177-3AD203B41FA5}">
-                      <a16:colId xmlns:a16="http://schemas.microsoft.com/office/drawing/2014/main" xmlns="" val="3157286281"/>
+                      <a16:colId xmlns="" xmlns:a16="http://schemas.microsoft.com/office/drawing/2014/main" val="3157286281"/>
                     </a:ext>
                   </a:extLst>
                 </a:gridCol>
@@ -19290,7 +19322,7 @@
                 </a:tc>
                 <a:extLst>
                   <a:ext uri="{0D108BD9-81ED-4DB2-BD59-A6C34878D82A}">
-                    <a16:rowId xmlns:a16="http://schemas.microsoft.com/office/drawing/2014/main" xmlns="" val="10357417"/>
+                    <a16:rowId xmlns="" xmlns:a16="http://schemas.microsoft.com/office/drawing/2014/main" val="10357417"/>
                   </a:ext>
                 </a:extLst>
               </a:tr>
@@ -19421,7 +19453,7 @@
                 </a:tc>
                 <a:extLst>
                   <a:ext uri="{0D108BD9-81ED-4DB2-BD59-A6C34878D82A}">
-                    <a16:rowId xmlns:a16="http://schemas.microsoft.com/office/drawing/2014/main" xmlns="" val="1881350119"/>
+                    <a16:rowId xmlns="" xmlns:a16="http://schemas.microsoft.com/office/drawing/2014/main" val="1881350119"/>
                   </a:ext>
                 </a:extLst>
               </a:tr>
@@ -19596,7 +19628,7 @@
                 </a:tc>
                 <a:extLst>
                   <a:ext uri="{0D108BD9-81ED-4DB2-BD59-A6C34878D82A}">
-                    <a16:rowId xmlns:a16="http://schemas.microsoft.com/office/drawing/2014/main" xmlns="" val="1466771304"/>
+                    <a16:rowId xmlns="" xmlns:a16="http://schemas.microsoft.com/office/drawing/2014/main" val="1466771304"/>
                   </a:ext>
                 </a:extLst>
               </a:tr>
@@ -19771,7 +19803,7 @@
                 </a:tc>
                 <a:extLst>
                   <a:ext uri="{0D108BD9-81ED-4DB2-BD59-A6C34878D82A}">
-                    <a16:rowId xmlns:a16="http://schemas.microsoft.com/office/drawing/2014/main" xmlns="" val="1360372986"/>
+                    <a16:rowId xmlns="" xmlns:a16="http://schemas.microsoft.com/office/drawing/2014/main" val="1360372986"/>
                   </a:ext>
                 </a:extLst>
               </a:tr>
@@ -20143,7 +20175,7 @@
                 </a:tc>
                 <a:extLst>
                   <a:ext uri="{0D108BD9-81ED-4DB2-BD59-A6C34878D82A}">
-                    <a16:rowId xmlns:a16="http://schemas.microsoft.com/office/drawing/2014/main" xmlns="" val="2030655908"/>
+                    <a16:rowId xmlns="" xmlns:a16="http://schemas.microsoft.com/office/drawing/2014/main" val="2030655908"/>
                   </a:ext>
                 </a:extLst>
               </a:tr>
@@ -20373,7 +20405,7 @@
                 </a:tc>
                 <a:extLst>
                   <a:ext uri="{0D108BD9-81ED-4DB2-BD59-A6C34878D82A}">
-                    <a16:rowId xmlns:a16="http://schemas.microsoft.com/office/drawing/2014/main" xmlns="" val="409827977"/>
+                    <a16:rowId xmlns="" xmlns:a16="http://schemas.microsoft.com/office/drawing/2014/main" val="409827977"/>
                   </a:ext>
                 </a:extLst>
               </a:tr>
@@ -20559,7 +20591,7 @@
                 </a:tc>
                 <a:extLst>
                   <a:ext uri="{0D108BD9-81ED-4DB2-BD59-A6C34878D82A}">
-                    <a16:rowId xmlns:a16="http://schemas.microsoft.com/office/drawing/2014/main" xmlns="" val="869534706"/>
+                    <a16:rowId xmlns="" xmlns:a16="http://schemas.microsoft.com/office/drawing/2014/main" val="869534706"/>
                   </a:ext>
                 </a:extLst>
               </a:tr>
@@ -20745,7 +20777,7 @@
                 </a:tc>
                 <a:extLst>
                   <a:ext uri="{0D108BD9-81ED-4DB2-BD59-A6C34878D82A}">
-                    <a16:rowId xmlns:a16="http://schemas.microsoft.com/office/drawing/2014/main" xmlns="" val="376353898"/>
+                    <a16:rowId xmlns="" xmlns:a16="http://schemas.microsoft.com/office/drawing/2014/main" val="376353898"/>
                   </a:ext>
                 </a:extLst>
               </a:tr>
@@ -21013,7 +21045,7 @@
                 </a:tc>
                 <a:extLst>
                   <a:ext uri="{0D108BD9-81ED-4DB2-BD59-A6C34878D82A}">
-                    <a16:rowId xmlns:a16="http://schemas.microsoft.com/office/drawing/2014/main" xmlns="" val="3084526821"/>
+                    <a16:rowId xmlns="" xmlns:a16="http://schemas.microsoft.com/office/drawing/2014/main" val="3084526821"/>
                   </a:ext>
                 </a:extLst>
               </a:tr>
@@ -21188,7 +21220,7 @@
                 </a:tc>
                 <a:extLst>
                   <a:ext uri="{0D108BD9-81ED-4DB2-BD59-A6C34878D82A}">
-                    <a16:rowId xmlns:a16="http://schemas.microsoft.com/office/drawing/2014/main" xmlns="" val="3303074763"/>
+                    <a16:rowId xmlns="" xmlns:a16="http://schemas.microsoft.com/office/drawing/2014/main" val="3303074763"/>
                   </a:ext>
                 </a:extLst>
               </a:tr>
@@ -21385,7 +21417,7 @@
                 </a:tc>
                 <a:extLst>
                   <a:ext uri="{0D108BD9-81ED-4DB2-BD59-A6C34878D82A}">
-                    <a16:rowId xmlns:a16="http://schemas.microsoft.com/office/drawing/2014/main" xmlns="" val="3971897777"/>
+                    <a16:rowId xmlns="" xmlns:a16="http://schemas.microsoft.com/office/drawing/2014/main" val="3971897777"/>
                   </a:ext>
                 </a:extLst>
               </a:tr>
@@ -21398,7 +21430,7 @@
           <p:cNvPr id="13" name="文本框 12">
             <a:extLst>
               <a:ext uri="{FF2B5EF4-FFF2-40B4-BE49-F238E27FC236}">
-                <a16:creationId xmlns:a16="http://schemas.microsoft.com/office/drawing/2014/main" xmlns="" id="{740F5E40-DCD1-41FA-94E2-CA9CA7EC8E7F}"/>
+                <a16:creationId xmlns="" xmlns:a16="http://schemas.microsoft.com/office/drawing/2014/main" id="{740F5E40-DCD1-41FA-94E2-CA9CA7EC8E7F}"/>
               </a:ext>
             </a:extLst>
           </p:cNvPr>
@@ -21480,7 +21512,7 @@
           <p:cNvPr id="14" name="文本框 13">
             <a:extLst>
               <a:ext uri="{FF2B5EF4-FFF2-40B4-BE49-F238E27FC236}">
-                <a16:creationId xmlns:a16="http://schemas.microsoft.com/office/drawing/2014/main" xmlns="" id="{66ED3A95-7245-4310-8354-479C4A30391B}"/>
+                <a16:creationId xmlns="" xmlns:a16="http://schemas.microsoft.com/office/drawing/2014/main" id="{66ED3A95-7245-4310-8354-479C4A30391B}"/>
               </a:ext>
             </a:extLst>
           </p:cNvPr>
@@ -21583,7 +21615,7 @@
           <p:cNvPr id="12" name="矩形 11">
             <a:extLst>
               <a:ext uri="{FF2B5EF4-FFF2-40B4-BE49-F238E27FC236}">
-                <a16:creationId xmlns:a16="http://schemas.microsoft.com/office/drawing/2014/main" xmlns="" id="{42B28CF3-1023-471A-85FC-9F9F3ADC12F8}"/>
+                <a16:creationId xmlns="" xmlns:a16="http://schemas.microsoft.com/office/drawing/2014/main" id="{42B28CF3-1023-471A-85FC-9F9F3ADC12F8}"/>
               </a:ext>
             </a:extLst>
           </p:cNvPr>
@@ -21649,7 +21681,7 @@
           <p:cNvPr id="8" name="表格 7">
             <a:extLst>
               <a:ext uri="{FF2B5EF4-FFF2-40B4-BE49-F238E27FC236}">
-                <a16:creationId xmlns:a16="http://schemas.microsoft.com/office/drawing/2014/main" xmlns="" id="{DF1018AF-4BB1-46F7-91DD-90F84352DBBF}"/>
+                <a16:creationId xmlns="" xmlns:a16="http://schemas.microsoft.com/office/drawing/2014/main" id="{DF1018AF-4BB1-46F7-91DD-90F84352DBBF}"/>
               </a:ext>
             </a:extLst>
           </p:cNvPr>
@@ -21678,21 +21710,21 @@
                 <a:gridCol w="2180823">
                   <a:extLst>
                     <a:ext uri="{9D8B030D-6E8A-4147-A177-3AD203B41FA5}">
-                      <a16:colId xmlns:a16="http://schemas.microsoft.com/office/drawing/2014/main" xmlns="" val="271949209"/>
+                      <a16:colId xmlns="" xmlns:a16="http://schemas.microsoft.com/office/drawing/2014/main" val="271949209"/>
                     </a:ext>
                   </a:extLst>
                 </a:gridCol>
                 <a:gridCol w="1940417">
                   <a:extLst>
                     <a:ext uri="{9D8B030D-6E8A-4147-A177-3AD203B41FA5}">
-                      <a16:colId xmlns:a16="http://schemas.microsoft.com/office/drawing/2014/main" xmlns="" val="483794282"/>
+                      <a16:colId xmlns="" xmlns:a16="http://schemas.microsoft.com/office/drawing/2014/main" val="483794282"/>
                     </a:ext>
                   </a:extLst>
                 </a:gridCol>
                 <a:gridCol w="4350688">
                   <a:extLst>
                     <a:ext uri="{9D8B030D-6E8A-4147-A177-3AD203B41FA5}">
-                      <a16:colId xmlns:a16="http://schemas.microsoft.com/office/drawing/2014/main" xmlns="" val="3157286281"/>
+                      <a16:colId xmlns="" xmlns:a16="http://schemas.microsoft.com/office/drawing/2014/main" val="3157286281"/>
                     </a:ext>
                   </a:extLst>
                 </a:gridCol>
@@ -21745,7 +21777,7 @@
                 </a:tc>
                 <a:extLst>
                   <a:ext uri="{0D108BD9-81ED-4DB2-BD59-A6C34878D82A}">
-                    <a16:rowId xmlns:a16="http://schemas.microsoft.com/office/drawing/2014/main" xmlns="" val="10357417"/>
+                    <a16:rowId xmlns="" xmlns:a16="http://schemas.microsoft.com/office/drawing/2014/main" val="10357417"/>
                   </a:ext>
                 </a:extLst>
               </a:tr>
@@ -22064,7 +22096,7 @@
                 </a:tc>
                 <a:extLst>
                   <a:ext uri="{0D108BD9-81ED-4DB2-BD59-A6C34878D82A}">
-                    <a16:rowId xmlns:a16="http://schemas.microsoft.com/office/drawing/2014/main" xmlns="" val="1881350119"/>
+                    <a16:rowId xmlns="" xmlns:a16="http://schemas.microsoft.com/office/drawing/2014/main" val="1881350119"/>
                   </a:ext>
                 </a:extLst>
               </a:tr>
@@ -22191,7 +22223,7 @@
                 </a:tc>
                 <a:extLst>
                   <a:ext uri="{0D108BD9-81ED-4DB2-BD59-A6C34878D82A}">
-                    <a16:rowId xmlns:a16="http://schemas.microsoft.com/office/drawing/2014/main" xmlns="" val="1466771304"/>
+                    <a16:rowId xmlns="" xmlns:a16="http://schemas.microsoft.com/office/drawing/2014/main" val="1466771304"/>
                   </a:ext>
                 </a:extLst>
               </a:tr>
@@ -22318,7 +22350,7 @@
                 </a:tc>
                 <a:extLst>
                   <a:ext uri="{0D108BD9-81ED-4DB2-BD59-A6C34878D82A}">
-                    <a16:rowId xmlns:a16="http://schemas.microsoft.com/office/drawing/2014/main" xmlns="" val="1360372986"/>
+                    <a16:rowId xmlns="" xmlns:a16="http://schemas.microsoft.com/office/drawing/2014/main" val="1360372986"/>
                   </a:ext>
                 </a:extLst>
               </a:tr>
@@ -22472,7 +22504,7 @@
                 </a:tc>
                 <a:extLst>
                   <a:ext uri="{0D108BD9-81ED-4DB2-BD59-A6C34878D82A}">
-                    <a16:rowId xmlns:a16="http://schemas.microsoft.com/office/drawing/2014/main" xmlns="" val="3517042196"/>
+                    <a16:rowId xmlns="" xmlns:a16="http://schemas.microsoft.com/office/drawing/2014/main" val="3517042196"/>
                   </a:ext>
                 </a:extLst>
               </a:tr>
@@ -22485,7 +22517,7 @@
           <p:cNvPr id="13" name="文本框 12">
             <a:extLst>
               <a:ext uri="{FF2B5EF4-FFF2-40B4-BE49-F238E27FC236}">
-                <a16:creationId xmlns:a16="http://schemas.microsoft.com/office/drawing/2014/main" xmlns="" id="{740F5E40-DCD1-41FA-94E2-CA9CA7EC8E7F}"/>
+                <a16:creationId xmlns="" xmlns:a16="http://schemas.microsoft.com/office/drawing/2014/main" id="{740F5E40-DCD1-41FA-94E2-CA9CA7EC8E7F}"/>
               </a:ext>
             </a:extLst>
           </p:cNvPr>
@@ -22567,7 +22599,7 @@
           <p:cNvPr id="14" name="文本框 13">
             <a:extLst>
               <a:ext uri="{FF2B5EF4-FFF2-40B4-BE49-F238E27FC236}">
-                <a16:creationId xmlns:a16="http://schemas.microsoft.com/office/drawing/2014/main" xmlns="" id="{66ED3A95-7245-4310-8354-479C4A30391B}"/>
+                <a16:creationId xmlns="" xmlns:a16="http://schemas.microsoft.com/office/drawing/2014/main" id="{66ED3A95-7245-4310-8354-479C4A30391B}"/>
               </a:ext>
             </a:extLst>
           </p:cNvPr>
@@ -22689,7 +22721,7 @@
           <p:cNvPr id="12" name="矩形 11">
             <a:extLst>
               <a:ext uri="{FF2B5EF4-FFF2-40B4-BE49-F238E27FC236}">
-                <a16:creationId xmlns:a16="http://schemas.microsoft.com/office/drawing/2014/main" xmlns="" id="{42B28CF3-1023-471A-85FC-9F9F3ADC12F8}"/>
+                <a16:creationId xmlns="" xmlns:a16="http://schemas.microsoft.com/office/drawing/2014/main" id="{42B28CF3-1023-471A-85FC-9F9F3ADC12F8}"/>
               </a:ext>
             </a:extLst>
           </p:cNvPr>
@@ -22755,7 +22787,7 @@
           <p:cNvPr id="8" name="表格 7">
             <a:extLst>
               <a:ext uri="{FF2B5EF4-FFF2-40B4-BE49-F238E27FC236}">
-                <a16:creationId xmlns:a16="http://schemas.microsoft.com/office/drawing/2014/main" xmlns="" id="{DF1018AF-4BB1-46F7-91DD-90F84352DBBF}"/>
+                <a16:creationId xmlns="" xmlns:a16="http://schemas.microsoft.com/office/drawing/2014/main" id="{DF1018AF-4BB1-46F7-91DD-90F84352DBBF}"/>
               </a:ext>
             </a:extLst>
           </p:cNvPr>
@@ -22784,21 +22816,21 @@
                 <a:gridCol w="2180823">
                   <a:extLst>
                     <a:ext uri="{9D8B030D-6E8A-4147-A177-3AD203B41FA5}">
-                      <a16:colId xmlns:a16="http://schemas.microsoft.com/office/drawing/2014/main" xmlns="" val="271949209"/>
+                      <a16:colId xmlns="" xmlns:a16="http://schemas.microsoft.com/office/drawing/2014/main" val="271949209"/>
                     </a:ext>
                   </a:extLst>
                 </a:gridCol>
                 <a:gridCol w="1803043">
                   <a:extLst>
                     <a:ext uri="{9D8B030D-6E8A-4147-A177-3AD203B41FA5}">
-                      <a16:colId xmlns:a16="http://schemas.microsoft.com/office/drawing/2014/main" xmlns="" val="483794282"/>
+                      <a16:colId xmlns="" xmlns:a16="http://schemas.microsoft.com/office/drawing/2014/main" val="483794282"/>
                     </a:ext>
                   </a:extLst>
                 </a:gridCol>
                 <a:gridCol w="4488063">
                   <a:extLst>
                     <a:ext uri="{9D8B030D-6E8A-4147-A177-3AD203B41FA5}">
-                      <a16:colId xmlns:a16="http://schemas.microsoft.com/office/drawing/2014/main" xmlns="" val="3157286281"/>
+                      <a16:colId xmlns="" xmlns:a16="http://schemas.microsoft.com/office/drawing/2014/main" val="3157286281"/>
                     </a:ext>
                   </a:extLst>
                 </a:gridCol>
@@ -22851,7 +22883,7 @@
                 </a:tc>
                 <a:extLst>
                   <a:ext uri="{0D108BD9-81ED-4DB2-BD59-A6C34878D82A}">
-                    <a16:rowId xmlns:a16="http://schemas.microsoft.com/office/drawing/2014/main" xmlns="" val="10357417"/>
+                    <a16:rowId xmlns="" xmlns:a16="http://schemas.microsoft.com/office/drawing/2014/main" val="10357417"/>
                   </a:ext>
                 </a:extLst>
               </a:tr>
@@ -22967,7 +22999,7 @@
                 </a:tc>
                 <a:extLst>
                   <a:ext uri="{0D108BD9-81ED-4DB2-BD59-A6C34878D82A}">
-                    <a16:rowId xmlns:a16="http://schemas.microsoft.com/office/drawing/2014/main" xmlns="" val="1881350119"/>
+                    <a16:rowId xmlns="" xmlns:a16="http://schemas.microsoft.com/office/drawing/2014/main" val="1881350119"/>
                   </a:ext>
                 </a:extLst>
               </a:tr>
@@ -23154,7 +23186,7 @@
                 </a:tc>
                 <a:extLst>
                   <a:ext uri="{0D108BD9-81ED-4DB2-BD59-A6C34878D82A}">
-                    <a16:rowId xmlns:a16="http://schemas.microsoft.com/office/drawing/2014/main" xmlns="" val="1466771304"/>
+                    <a16:rowId xmlns="" xmlns:a16="http://schemas.microsoft.com/office/drawing/2014/main" val="1466771304"/>
                   </a:ext>
                 </a:extLst>
               </a:tr>
@@ -23281,7 +23313,7 @@
                 </a:tc>
                 <a:extLst>
                   <a:ext uri="{0D108BD9-81ED-4DB2-BD59-A6C34878D82A}">
-                    <a16:rowId xmlns:a16="http://schemas.microsoft.com/office/drawing/2014/main" xmlns="" val="1360372986"/>
+                    <a16:rowId xmlns="" xmlns:a16="http://schemas.microsoft.com/office/drawing/2014/main" val="1360372986"/>
                   </a:ext>
                 </a:extLst>
               </a:tr>
@@ -23463,7 +23495,7 @@
                 </a:tc>
                 <a:extLst>
                   <a:ext uri="{0D108BD9-81ED-4DB2-BD59-A6C34878D82A}">
-                    <a16:rowId xmlns:a16="http://schemas.microsoft.com/office/drawing/2014/main" xmlns="" val="3517042196"/>
+                    <a16:rowId xmlns="" xmlns:a16="http://schemas.microsoft.com/office/drawing/2014/main" val="3517042196"/>
                   </a:ext>
                 </a:extLst>
               </a:tr>
@@ -23562,7 +23594,7 @@
                 </a:tc>
                 <a:extLst>
                   <a:ext uri="{0D108BD9-81ED-4DB2-BD59-A6C34878D82A}">
-                    <a16:rowId xmlns:a16="http://schemas.microsoft.com/office/drawing/2014/main" xmlns="" val="2030655908"/>
+                    <a16:rowId xmlns="" xmlns:a16="http://schemas.microsoft.com/office/drawing/2014/main" val="2030655908"/>
                   </a:ext>
                 </a:extLst>
               </a:tr>
@@ -23705,7 +23737,7 @@
                 </a:tc>
                 <a:extLst>
                   <a:ext uri="{0D108BD9-81ED-4DB2-BD59-A6C34878D82A}">
-                    <a16:rowId xmlns:a16="http://schemas.microsoft.com/office/drawing/2014/main" xmlns="" val="409827977"/>
+                    <a16:rowId xmlns="" xmlns:a16="http://schemas.microsoft.com/office/drawing/2014/main" val="409827977"/>
                   </a:ext>
                 </a:extLst>
               </a:tr>
@@ -23870,7 +23902,7 @@
                 </a:tc>
                 <a:extLst>
                   <a:ext uri="{0D108BD9-81ED-4DB2-BD59-A6C34878D82A}">
-                    <a16:rowId xmlns:a16="http://schemas.microsoft.com/office/drawing/2014/main" xmlns="" val="869534706"/>
+                    <a16:rowId xmlns="" xmlns:a16="http://schemas.microsoft.com/office/drawing/2014/main" val="869534706"/>
                   </a:ext>
                 </a:extLst>
               </a:tr>
@@ -24029,7 +24061,7 @@
                 </a:tc>
                 <a:extLst>
                   <a:ext uri="{0D108BD9-81ED-4DB2-BD59-A6C34878D82A}">
-                    <a16:rowId xmlns:a16="http://schemas.microsoft.com/office/drawing/2014/main" xmlns="" val="376353898"/>
+                    <a16:rowId xmlns="" xmlns:a16="http://schemas.microsoft.com/office/drawing/2014/main" val="376353898"/>
                   </a:ext>
                 </a:extLst>
               </a:tr>
@@ -24256,7 +24288,7 @@
                 </a:tc>
                 <a:extLst>
                   <a:ext uri="{0D108BD9-81ED-4DB2-BD59-A6C34878D82A}">
-                    <a16:rowId xmlns:a16="http://schemas.microsoft.com/office/drawing/2014/main" xmlns="" val="3084526821"/>
+                    <a16:rowId xmlns="" xmlns:a16="http://schemas.microsoft.com/office/drawing/2014/main" val="3084526821"/>
                   </a:ext>
                 </a:extLst>
               </a:tr>
@@ -24399,7 +24431,7 @@
                 </a:tc>
                 <a:extLst>
                   <a:ext uri="{0D108BD9-81ED-4DB2-BD59-A6C34878D82A}">
-                    <a16:rowId xmlns:a16="http://schemas.microsoft.com/office/drawing/2014/main" xmlns="" val="3303074763"/>
+                    <a16:rowId xmlns="" xmlns:a16="http://schemas.microsoft.com/office/drawing/2014/main" val="3303074763"/>
                   </a:ext>
                 </a:extLst>
               </a:tr>
@@ -24641,7 +24673,7 @@
                 </a:tc>
                 <a:extLst>
                   <a:ext uri="{0D108BD9-81ED-4DB2-BD59-A6C34878D82A}">
-                    <a16:rowId xmlns:a16="http://schemas.microsoft.com/office/drawing/2014/main" xmlns="" val="3971897777"/>
+                    <a16:rowId xmlns="" xmlns:a16="http://schemas.microsoft.com/office/drawing/2014/main" val="3971897777"/>
                   </a:ext>
                 </a:extLst>
               </a:tr>
@@ -24654,7 +24686,7 @@
           <p:cNvPr id="13" name="文本框 12">
             <a:extLst>
               <a:ext uri="{FF2B5EF4-FFF2-40B4-BE49-F238E27FC236}">
-                <a16:creationId xmlns:a16="http://schemas.microsoft.com/office/drawing/2014/main" xmlns="" id="{740F5E40-DCD1-41FA-94E2-CA9CA7EC8E7F}"/>
+                <a16:creationId xmlns="" xmlns:a16="http://schemas.microsoft.com/office/drawing/2014/main" id="{740F5E40-DCD1-41FA-94E2-CA9CA7EC8E7F}"/>
               </a:ext>
             </a:extLst>
           </p:cNvPr>
@@ -24736,7 +24768,7 @@
           <p:cNvPr id="6" name="文本框 5">
             <a:extLst>
               <a:ext uri="{FF2B5EF4-FFF2-40B4-BE49-F238E27FC236}">
-                <a16:creationId xmlns:a16="http://schemas.microsoft.com/office/drawing/2014/main" xmlns="" id="{66ED3A95-7245-4310-8354-479C4A30391B}"/>
+                <a16:creationId xmlns="" xmlns:a16="http://schemas.microsoft.com/office/drawing/2014/main" id="{66ED3A95-7245-4310-8354-479C4A30391B}"/>
               </a:ext>
             </a:extLst>
           </p:cNvPr>
@@ -24839,7 +24871,7 @@
           <p:cNvPr id="12" name="矩形 11">
             <a:extLst>
               <a:ext uri="{FF2B5EF4-FFF2-40B4-BE49-F238E27FC236}">
-                <a16:creationId xmlns:a16="http://schemas.microsoft.com/office/drawing/2014/main" xmlns="" id="{42B28CF3-1023-471A-85FC-9F9F3ADC12F8}"/>
+                <a16:creationId xmlns="" xmlns:a16="http://schemas.microsoft.com/office/drawing/2014/main" id="{42B28CF3-1023-471A-85FC-9F9F3ADC12F8}"/>
               </a:ext>
             </a:extLst>
           </p:cNvPr>
@@ -24905,7 +24937,7 @@
           <p:cNvPr id="8" name="表格 7">
             <a:extLst>
               <a:ext uri="{FF2B5EF4-FFF2-40B4-BE49-F238E27FC236}">
-                <a16:creationId xmlns:a16="http://schemas.microsoft.com/office/drawing/2014/main" xmlns="" id="{DF1018AF-4BB1-46F7-91DD-90F84352DBBF}"/>
+                <a16:creationId xmlns="" xmlns:a16="http://schemas.microsoft.com/office/drawing/2014/main" id="{DF1018AF-4BB1-46F7-91DD-90F84352DBBF}"/>
               </a:ext>
             </a:extLst>
           </p:cNvPr>
@@ -24934,21 +24966,21 @@
                 <a:gridCol w="2180823">
                   <a:extLst>
                     <a:ext uri="{9D8B030D-6E8A-4147-A177-3AD203B41FA5}">
-                      <a16:colId xmlns:a16="http://schemas.microsoft.com/office/drawing/2014/main" xmlns="" val="271949209"/>
+                      <a16:colId xmlns="" xmlns:a16="http://schemas.microsoft.com/office/drawing/2014/main" val="271949209"/>
                     </a:ext>
                   </a:extLst>
                 </a:gridCol>
                 <a:gridCol w="1803043">
                   <a:extLst>
                     <a:ext uri="{9D8B030D-6E8A-4147-A177-3AD203B41FA5}">
-                      <a16:colId xmlns:a16="http://schemas.microsoft.com/office/drawing/2014/main" xmlns="" val="483794282"/>
+                      <a16:colId xmlns="" xmlns:a16="http://schemas.microsoft.com/office/drawing/2014/main" val="483794282"/>
                     </a:ext>
                   </a:extLst>
                 </a:gridCol>
                 <a:gridCol w="4488063">
                   <a:extLst>
                     <a:ext uri="{9D8B030D-6E8A-4147-A177-3AD203B41FA5}">
-                      <a16:colId xmlns:a16="http://schemas.microsoft.com/office/drawing/2014/main" xmlns="" val="3157286281"/>
+                      <a16:colId xmlns="" xmlns:a16="http://schemas.microsoft.com/office/drawing/2014/main" val="3157286281"/>
                     </a:ext>
                   </a:extLst>
                 </a:gridCol>
@@ -25001,7 +25033,7 @@
                 </a:tc>
                 <a:extLst>
                   <a:ext uri="{0D108BD9-81ED-4DB2-BD59-A6C34878D82A}">
-                    <a16:rowId xmlns:a16="http://schemas.microsoft.com/office/drawing/2014/main" xmlns="" val="10357417"/>
+                    <a16:rowId xmlns="" xmlns:a16="http://schemas.microsoft.com/office/drawing/2014/main" val="10357417"/>
                   </a:ext>
                 </a:extLst>
               </a:tr>
@@ -25249,7 +25281,7 @@
                 </a:tc>
                 <a:extLst>
                   <a:ext uri="{0D108BD9-81ED-4DB2-BD59-A6C34878D82A}">
-                    <a16:rowId xmlns:a16="http://schemas.microsoft.com/office/drawing/2014/main" xmlns="" val="1881350119"/>
+                    <a16:rowId xmlns="" xmlns:a16="http://schemas.microsoft.com/office/drawing/2014/main" val="1881350119"/>
                   </a:ext>
                 </a:extLst>
               </a:tr>
@@ -25414,7 +25446,7 @@
                 </a:tc>
                 <a:extLst>
                   <a:ext uri="{0D108BD9-81ED-4DB2-BD59-A6C34878D82A}">
-                    <a16:rowId xmlns:a16="http://schemas.microsoft.com/office/drawing/2014/main" xmlns="" val="1466771304"/>
+                    <a16:rowId xmlns="" xmlns:a16="http://schemas.microsoft.com/office/drawing/2014/main" val="1466771304"/>
                   </a:ext>
                 </a:extLst>
               </a:tr>
@@ -25571,7 +25603,7 @@
                 </a:tc>
                 <a:extLst>
                   <a:ext uri="{0D108BD9-81ED-4DB2-BD59-A6C34878D82A}">
-                    <a16:rowId xmlns:a16="http://schemas.microsoft.com/office/drawing/2014/main" xmlns="" val="1360372986"/>
+                    <a16:rowId xmlns="" xmlns:a16="http://schemas.microsoft.com/office/drawing/2014/main" val="1360372986"/>
                   </a:ext>
                 </a:extLst>
               </a:tr>
@@ -25701,7 +25733,7 @@
                 </a:tc>
                 <a:extLst>
                   <a:ext uri="{0D108BD9-81ED-4DB2-BD59-A6C34878D82A}">
-                    <a16:rowId xmlns:a16="http://schemas.microsoft.com/office/drawing/2014/main" xmlns="" val="3517042196"/>
+                    <a16:rowId xmlns="" xmlns:a16="http://schemas.microsoft.com/office/drawing/2014/main" val="3517042196"/>
                   </a:ext>
                 </a:extLst>
               </a:tr>
@@ -25714,7 +25746,7 @@
           <p:cNvPr id="13" name="文本框 12">
             <a:extLst>
               <a:ext uri="{FF2B5EF4-FFF2-40B4-BE49-F238E27FC236}">
-                <a16:creationId xmlns:a16="http://schemas.microsoft.com/office/drawing/2014/main" xmlns="" id="{740F5E40-DCD1-41FA-94E2-CA9CA7EC8E7F}"/>
+                <a16:creationId xmlns="" xmlns:a16="http://schemas.microsoft.com/office/drawing/2014/main" id="{740F5E40-DCD1-41FA-94E2-CA9CA7EC8E7F}"/>
               </a:ext>
             </a:extLst>
           </p:cNvPr>
@@ -25796,7 +25828,7 @@
           <p:cNvPr id="14" name="文本框 13">
             <a:extLst>
               <a:ext uri="{FF2B5EF4-FFF2-40B4-BE49-F238E27FC236}">
-                <a16:creationId xmlns:a16="http://schemas.microsoft.com/office/drawing/2014/main" xmlns="" id="{66ED3A95-7245-4310-8354-479C4A30391B}"/>
+                <a16:creationId xmlns="" xmlns:a16="http://schemas.microsoft.com/office/drawing/2014/main" id="{66ED3A95-7245-4310-8354-479C4A30391B}"/>
               </a:ext>
             </a:extLst>
           </p:cNvPr>
@@ -26063,21 +26095,21 @@
                 <a:gridCol w="2180823">
                   <a:extLst>
                     <a:ext uri="{9D8B030D-6E8A-4147-A177-3AD203B41FA5}">
-                      <a16:colId xmlns="" xmlns:a16="http://schemas.microsoft.com/office/drawing/2014/main" val="20000"/>
+                      <a16:colId xmlns:a16="http://schemas.microsoft.com/office/drawing/2014/main" xmlns="" val="20000"/>
                     </a:ext>
                   </a:extLst>
                 </a:gridCol>
                 <a:gridCol w="1940417">
                   <a:extLst>
                     <a:ext uri="{9D8B030D-6E8A-4147-A177-3AD203B41FA5}">
-                      <a16:colId xmlns="" xmlns:a16="http://schemas.microsoft.com/office/drawing/2014/main" val="20001"/>
+                      <a16:colId xmlns:a16="http://schemas.microsoft.com/office/drawing/2014/main" xmlns="" val="20001"/>
                     </a:ext>
                   </a:extLst>
                 </a:gridCol>
                 <a:gridCol w="4350688">
                   <a:extLst>
                     <a:ext uri="{9D8B030D-6E8A-4147-A177-3AD203B41FA5}">
-                      <a16:colId xmlns="" xmlns:a16="http://schemas.microsoft.com/office/drawing/2014/main" val="20002"/>
+                      <a16:colId xmlns:a16="http://schemas.microsoft.com/office/drawing/2014/main" xmlns="" val="20002"/>
                     </a:ext>
                   </a:extLst>
                 </a:gridCol>
@@ -26130,7 +26162,7 @@
                 </a:tc>
                 <a:extLst>
                   <a:ext uri="{0D108BD9-81ED-4DB2-BD59-A6C34878D82A}">
-                    <a16:rowId xmlns="" xmlns:a16="http://schemas.microsoft.com/office/drawing/2014/main" val="10000"/>
+                    <a16:rowId xmlns:a16="http://schemas.microsoft.com/office/drawing/2014/main" xmlns="" val="10000"/>
                   </a:ext>
                 </a:extLst>
               </a:tr>
@@ -26258,7 +26290,7 @@
                 </a:tc>
                 <a:extLst>
                   <a:ext uri="{0D108BD9-81ED-4DB2-BD59-A6C34878D82A}">
-                    <a16:rowId xmlns="" xmlns:a16="http://schemas.microsoft.com/office/drawing/2014/main" val="10001"/>
+                    <a16:rowId xmlns:a16="http://schemas.microsoft.com/office/drawing/2014/main" xmlns="" val="10001"/>
                   </a:ext>
                 </a:extLst>
               </a:tr>
@@ -26430,7 +26462,7 @@
                 </a:tc>
                 <a:extLst>
                   <a:ext uri="{0D108BD9-81ED-4DB2-BD59-A6C34878D82A}">
-                    <a16:rowId xmlns="" xmlns:a16="http://schemas.microsoft.com/office/drawing/2014/main" val="10002"/>
+                    <a16:rowId xmlns:a16="http://schemas.microsoft.com/office/drawing/2014/main" xmlns="" val="10002"/>
                   </a:ext>
                 </a:extLst>
               </a:tr>
@@ -26602,7 +26634,7 @@
                 </a:tc>
                 <a:extLst>
                   <a:ext uri="{0D108BD9-81ED-4DB2-BD59-A6C34878D82A}">
-                    <a16:rowId xmlns="" xmlns:a16="http://schemas.microsoft.com/office/drawing/2014/main" val="10003"/>
+                    <a16:rowId xmlns:a16="http://schemas.microsoft.com/office/drawing/2014/main" xmlns="" val="10003"/>
                   </a:ext>
                 </a:extLst>
               </a:tr>
@@ -26825,7 +26857,7 @@
                 </a:tc>
                 <a:extLst>
                   <a:ext uri="{0D108BD9-81ED-4DB2-BD59-A6C34878D82A}">
-                    <a16:rowId xmlns="" xmlns:a16="http://schemas.microsoft.com/office/drawing/2014/main" val="10004"/>
+                    <a16:rowId xmlns:a16="http://schemas.microsoft.com/office/drawing/2014/main" xmlns="" val="10004"/>
                   </a:ext>
                 </a:extLst>
               </a:tr>
@@ -26953,7 +26985,7 @@
                 </a:tc>
                 <a:extLst>
                   <a:ext uri="{0D108BD9-81ED-4DB2-BD59-A6C34878D82A}">
-                    <a16:rowId xmlns="" xmlns:a16="http://schemas.microsoft.com/office/drawing/2014/main" val="10005"/>
+                    <a16:rowId xmlns:a16="http://schemas.microsoft.com/office/drawing/2014/main" xmlns="" val="10005"/>
                   </a:ext>
                 </a:extLst>
               </a:tr>
@@ -27158,7 +27190,7 @@
                 </a:tc>
                 <a:extLst>
                   <a:ext uri="{0D108BD9-81ED-4DB2-BD59-A6C34878D82A}">
-                    <a16:rowId xmlns="" xmlns:a16="http://schemas.microsoft.com/office/drawing/2014/main" val="10006"/>
+                    <a16:rowId xmlns:a16="http://schemas.microsoft.com/office/drawing/2014/main" xmlns="" val="10006"/>
                   </a:ext>
                 </a:extLst>
               </a:tr>
@@ -27385,7 +27417,7 @@
                 </a:tc>
                 <a:extLst>
                   <a:ext uri="{0D108BD9-81ED-4DB2-BD59-A6C34878D82A}">
-                    <a16:rowId xmlns="" xmlns:a16="http://schemas.microsoft.com/office/drawing/2014/main" val="10007"/>
+                    <a16:rowId xmlns:a16="http://schemas.microsoft.com/office/drawing/2014/main" xmlns="" val="10007"/>
                   </a:ext>
                 </a:extLst>
               </a:tr>
@@ -27568,7 +27600,7 @@
                 </a:tc>
                 <a:extLst>
                   <a:ext uri="{0D108BD9-81ED-4DB2-BD59-A6C34878D82A}">
-                    <a16:rowId xmlns="" xmlns:a16="http://schemas.microsoft.com/office/drawing/2014/main" val="10008"/>
+                    <a16:rowId xmlns:a16="http://schemas.microsoft.com/office/drawing/2014/main" xmlns="" val="10008"/>
                   </a:ext>
                 </a:extLst>
               </a:tr>
@@ -27751,7 +27783,7 @@
                 </a:tc>
                 <a:extLst>
                   <a:ext uri="{0D108BD9-81ED-4DB2-BD59-A6C34878D82A}">
-                    <a16:rowId xmlns="" xmlns:a16="http://schemas.microsoft.com/office/drawing/2014/main" val="10009"/>
+                    <a16:rowId xmlns:a16="http://schemas.microsoft.com/office/drawing/2014/main" xmlns="" val="10009"/>
                   </a:ext>
                 </a:extLst>
               </a:tr>
@@ -27822,7 +27854,7 @@
                 </a:tc>
                 <a:extLst>
                   <a:ext uri="{0D108BD9-81ED-4DB2-BD59-A6C34878D82A}">
-                    <a16:rowId xmlns="" xmlns:a16="http://schemas.microsoft.com/office/drawing/2014/main" val="10010"/>
+                    <a16:rowId xmlns:a16="http://schemas.microsoft.com/office/drawing/2014/main" xmlns="" val="10010"/>
                   </a:ext>
                 </a:extLst>
               </a:tr>
@@ -28093,7 +28125,7 @@
                 </a:tc>
                 <a:extLst>
                   <a:ext uri="{0D108BD9-81ED-4DB2-BD59-A6C34878D82A}">
-                    <a16:rowId xmlns="" xmlns:a16="http://schemas.microsoft.com/office/drawing/2014/main" val="10011"/>
+                    <a16:rowId xmlns:a16="http://schemas.microsoft.com/office/drawing/2014/main" xmlns="" val="10011"/>
                   </a:ext>
                 </a:extLst>
               </a:tr>
@@ -28265,7 +28297,7 @@
                 </a:tc>
                 <a:extLst>
                   <a:ext uri="{0D108BD9-81ED-4DB2-BD59-A6C34878D82A}">
-                    <a16:rowId xmlns="" xmlns:a16="http://schemas.microsoft.com/office/drawing/2014/main" val="10012"/>
+                    <a16:rowId xmlns:a16="http://schemas.microsoft.com/office/drawing/2014/main" xmlns="" val="10012"/>
                   </a:ext>
                 </a:extLst>
               </a:tr>
@@ -28454,7 +28486,7 @@
                 </a:tc>
                 <a:extLst>
                   <a:ext uri="{0D108BD9-81ED-4DB2-BD59-A6C34878D82A}">
-                    <a16:rowId xmlns="" xmlns:a16="http://schemas.microsoft.com/office/drawing/2014/main" val="10013"/>
+                    <a16:rowId xmlns:a16="http://schemas.microsoft.com/office/drawing/2014/main" xmlns="" val="10013"/>
                   </a:ext>
                 </a:extLst>
               </a:tr>
@@ -28721,7 +28753,7 @@
           <p:nvPr>
             <p:extLst>
               <p:ext uri="{D42A27DB-BD31-4B8C-83A1-F6EECF244321}">
-                <p14:modId xmlns:p14="http://schemas.microsoft.com/office/powerpoint/2010/main" val="2660696191"/>
+                <p14:modId xmlns:p14="http://schemas.microsoft.com/office/powerpoint/2010/main" val="978499445"/>
               </p:ext>
             </p:extLst>
           </p:nvPr>
@@ -28740,21 +28772,21 @@
                 <a:gridCol w="2180823">
                   <a:extLst>
                     <a:ext uri="{9D8B030D-6E8A-4147-A177-3AD203B41FA5}">
-                      <a16:colId xmlns="" xmlns:a16="http://schemas.microsoft.com/office/drawing/2014/main" val="20000"/>
+                      <a16:colId xmlns:a16="http://schemas.microsoft.com/office/drawing/2014/main" xmlns="" val="20000"/>
                     </a:ext>
                   </a:extLst>
                 </a:gridCol>
                 <a:gridCol w="1940417">
                   <a:extLst>
                     <a:ext uri="{9D8B030D-6E8A-4147-A177-3AD203B41FA5}">
-                      <a16:colId xmlns="" xmlns:a16="http://schemas.microsoft.com/office/drawing/2014/main" val="20001"/>
+                      <a16:colId xmlns:a16="http://schemas.microsoft.com/office/drawing/2014/main" xmlns="" val="20001"/>
                     </a:ext>
                   </a:extLst>
                 </a:gridCol>
                 <a:gridCol w="4350688">
                   <a:extLst>
                     <a:ext uri="{9D8B030D-6E8A-4147-A177-3AD203B41FA5}">
-                      <a16:colId xmlns="" xmlns:a16="http://schemas.microsoft.com/office/drawing/2014/main" val="20002"/>
+                      <a16:colId xmlns:a16="http://schemas.microsoft.com/office/drawing/2014/main" xmlns="" val="20002"/>
                     </a:ext>
                   </a:extLst>
                 </a:gridCol>
@@ -28807,7 +28839,7 @@
                 </a:tc>
                 <a:extLst>
                   <a:ext uri="{0D108BD9-81ED-4DB2-BD59-A6C34878D82A}">
-                    <a16:rowId xmlns="" xmlns:a16="http://schemas.microsoft.com/office/drawing/2014/main" val="10000"/>
+                    <a16:rowId xmlns:a16="http://schemas.microsoft.com/office/drawing/2014/main" xmlns="" val="10000"/>
                   </a:ext>
                 </a:extLst>
               </a:tr>
@@ -28935,7 +28967,7 @@
                 </a:tc>
                 <a:extLst>
                   <a:ext uri="{0D108BD9-81ED-4DB2-BD59-A6C34878D82A}">
-                    <a16:rowId xmlns="" xmlns:a16="http://schemas.microsoft.com/office/drawing/2014/main" val="10001"/>
+                    <a16:rowId xmlns:a16="http://schemas.microsoft.com/office/drawing/2014/main" xmlns="" val="10001"/>
                   </a:ext>
                 </a:extLst>
               </a:tr>
@@ -29127,7 +29159,7 @@
                 </a:tc>
                 <a:extLst>
                   <a:ext uri="{0D108BD9-81ED-4DB2-BD59-A6C34878D82A}">
-                    <a16:rowId xmlns="" xmlns:a16="http://schemas.microsoft.com/office/drawing/2014/main" val="10002"/>
+                    <a16:rowId xmlns:a16="http://schemas.microsoft.com/office/drawing/2014/main" xmlns="" val="10002"/>
                   </a:ext>
                 </a:extLst>
               </a:tr>
@@ -29254,7 +29286,7 @@
                 </a:tc>
                 <a:extLst>
                   <a:ext uri="{0D108BD9-81ED-4DB2-BD59-A6C34878D82A}">
-                    <a16:rowId xmlns="" xmlns:a16="http://schemas.microsoft.com/office/drawing/2014/main" val="10003"/>
+                    <a16:rowId xmlns:a16="http://schemas.microsoft.com/office/drawing/2014/main" xmlns="" val="10003"/>
                   </a:ext>
                 </a:extLst>
               </a:tr>
@@ -29381,7 +29413,7 @@
                 </a:tc>
                 <a:extLst>
                   <a:ext uri="{0D108BD9-81ED-4DB2-BD59-A6C34878D82A}">
-                    <a16:rowId xmlns="" xmlns:a16="http://schemas.microsoft.com/office/drawing/2014/main" val="10004"/>
+                    <a16:rowId xmlns:a16="http://schemas.microsoft.com/office/drawing/2014/main" xmlns="" val="10004"/>
                   </a:ext>
                 </a:extLst>
               </a:tr>
@@ -29393,6 +29425,17 @@
                     <a:p>
                       <a:pPr marL="0" algn="ctr" defTabSz="685800" rtl="0" eaLnBrk="1" latinLnBrk="0" hangingPunct="1"/>
                       <a:r>
+                        <a:rPr lang="en-US" altLang="en-US" sz="1100" b="1" kern="1200" dirty="0" err="1" smtClean="0">
+                          <a:solidFill>
+                            <a:schemeClr val="tx1"/>
+                          </a:solidFill>
+                          <a:latin typeface="微软雅黑" panose="020B0503020204020204" pitchFamily="34" charset="-122"/>
+                          <a:ea typeface="微软雅黑" panose="020B0503020204020204" pitchFamily="34" charset="-122"/>
+                          <a:cs typeface="+mn-cs"/>
+                        </a:rPr>
+                        <a:t>XiaoFeng</a:t>
+                      </a:r>
+                      <a:r>
                         <a:rPr lang="en-US" altLang="en-US" sz="1100" b="1" kern="1200" dirty="0" smtClean="0">
                           <a:solidFill>
                             <a:schemeClr val="tx1"/>
@@ -29401,10 +29444,10 @@
                           <a:ea typeface="微软雅黑" panose="020B0503020204020204" pitchFamily="34" charset="-122"/>
                           <a:cs typeface="+mn-cs"/>
                         </a:rPr>
-                        <a:t>LI Jensen </a:t>
-                      </a:r>
-                      <a:r>
-                        <a:rPr lang="en-US" altLang="en-US" sz="1100" b="1" kern="1200" dirty="0" err="1" smtClean="0">
+                        <a:t> Wang(</a:t>
+                      </a:r>
+                      <a:r>
+                        <a:rPr lang="zh-CN" altLang="en-US" sz="1100" b="1" kern="1200" dirty="0" smtClean="0">
                           <a:solidFill>
                             <a:schemeClr val="tx1"/>
                           </a:solidFill>
@@ -29412,10 +29455,10 @@
                           <a:ea typeface="微软雅黑" panose="020B0503020204020204" pitchFamily="34" charset="-122"/>
                           <a:cs typeface="+mn-cs"/>
                         </a:rPr>
-                        <a:t>Tsan</a:t>
-                      </a:r>
-                      <a:r>
-                        <a:rPr lang="en-US" altLang="en-US" sz="1100" b="1" kern="1200" dirty="0" smtClean="0">
+                        <a:t>王晓峰</a:t>
+                      </a:r>
+                      <a:r>
+                        <a:rPr lang="en-US" altLang="zh-CN" sz="1100" b="1" kern="1200" dirty="0" smtClean="0">
                           <a:solidFill>
                             <a:schemeClr val="tx1"/>
                           </a:solidFill>
@@ -29423,44 +29466,11 @@
                           <a:ea typeface="微软雅黑" panose="020B0503020204020204" pitchFamily="34" charset="-122"/>
                           <a:cs typeface="+mn-cs"/>
                         </a:rPr>
-                        <a:t> Hang</a:t>
-                      </a:r>
-                      <a:r>
-                        <a:rPr lang="en-US" altLang="zh-CN" sz="1100" b="1" kern="1200" dirty="0" smtClean="0">
-                          <a:solidFill>
-                            <a:schemeClr val="dk1"/>
-                          </a:solidFill>
-                          <a:latin typeface="微软雅黑" panose="020B0503020204020204" pitchFamily="34" charset="-122"/>
-                          <a:ea typeface="微软雅黑" panose="020B0503020204020204" pitchFamily="34" charset="-122"/>
-                          <a:cs typeface="+mn-cs"/>
-                        </a:rPr>
-                        <a:t>(</a:t>
-                      </a:r>
-                      <a:r>
-                        <a:rPr lang="zh-CN" altLang="en-US" sz="1100" b="1" kern="1200" dirty="0" smtClean="0">
-                          <a:solidFill>
-                            <a:schemeClr val="dk1"/>
-                          </a:solidFill>
-                          <a:latin typeface="微软雅黑" panose="020B0503020204020204" pitchFamily="34" charset="-122"/>
-                          <a:ea typeface="微软雅黑" panose="020B0503020204020204" pitchFamily="34" charset="-122"/>
-                          <a:cs typeface="+mn-cs"/>
-                        </a:rPr>
-                        <a:t>李赞恒</a:t>
-                      </a:r>
-                      <a:r>
-                        <a:rPr lang="en-US" altLang="zh-CN" sz="1100" b="1" kern="1200" dirty="0" smtClean="0">
-                          <a:solidFill>
-                            <a:schemeClr val="dk1"/>
-                          </a:solidFill>
-                          <a:latin typeface="微软雅黑" panose="020B0503020204020204" pitchFamily="34" charset="-122"/>
-                          <a:ea typeface="微软雅黑" panose="020B0503020204020204" pitchFamily="34" charset="-122"/>
-                          <a:cs typeface="+mn-cs"/>
-                        </a:rPr>
                         <a:t>)</a:t>
                       </a:r>
-                      <a:endParaRPr lang="zh-CN" altLang="zh-CN" sz="1100" b="1" kern="1200" dirty="0">
+                      <a:endParaRPr lang="en-US" altLang="zh-CN" sz="1100" b="1" kern="1200" dirty="0" smtClean="0">
                         <a:solidFill>
-                          <a:schemeClr val="dk1"/>
+                          <a:schemeClr val="tx1"/>
                         </a:solidFill>
                         <a:latin typeface="微软雅黑" panose="020B0503020204020204" pitchFamily="34" charset="-122"/>
                         <a:ea typeface="微软雅黑" panose="020B0503020204020204" pitchFamily="34" charset="-122"/>
@@ -29504,44 +29514,52 @@
                     <a:bodyPr/>
                     <a:lstStyle/>
                     <a:p>
-                      <a:pPr marL="0" algn="ctr" defTabSz="685800" rtl="0" eaLnBrk="1" latinLnBrk="0" hangingPunct="1"/>
-                      <a:r>
-                        <a:rPr lang="en-US" altLang="zh-CN" sz="1100" b="1" kern="1200" dirty="0" smtClean="0">
-                          <a:solidFill>
-                            <a:schemeClr val="dk1"/>
-                          </a:solidFill>
-                          <a:latin typeface="微软雅黑" panose="020B0503020204020204" pitchFamily="34" charset="-122"/>
-                          <a:ea typeface="微软雅黑" panose="020B0503020204020204" pitchFamily="34" charset="-122"/>
-                          <a:cs typeface="+mn-cs"/>
-                        </a:rPr>
-                        <a:t>Elastic </a:t>
-                      </a:r>
-                      <a:r>
-                        <a:rPr lang="en-US" altLang="zh-CN" sz="1100" b="1" kern="1200" dirty="0" err="1" smtClean="0">
-                          <a:solidFill>
-                            <a:schemeClr val="dk1"/>
-                          </a:solidFill>
-                          <a:latin typeface="微软雅黑" panose="020B0503020204020204" pitchFamily="34" charset="-122"/>
-                          <a:ea typeface="微软雅黑" panose="020B0503020204020204" pitchFamily="34" charset="-122"/>
-                          <a:cs typeface="+mn-cs"/>
-                        </a:rPr>
-                        <a:t>metasurfaces</a:t>
-                      </a:r>
-                      <a:endParaRPr lang="zh-CN" altLang="en-US" sz="1100" b="1" kern="1200" dirty="0">
-                        <a:solidFill>
-                          <a:schemeClr val="dk1"/>
-                        </a:solidFill>
-                        <a:latin typeface="微软雅黑" panose="020B0503020204020204" pitchFamily="34" charset="-122"/>
-                        <a:ea typeface="微软雅黑" panose="020B0503020204020204" pitchFamily="34" charset="-122"/>
-                        <a:cs typeface="+mn-cs"/>
-                      </a:endParaRPr>
+                      <a:pPr marL="0" marR="0" indent="0" algn="ctr" defTabSz="685800" rtl="0" eaLnBrk="1" fontAlgn="auto" latinLnBrk="0" hangingPunct="1">
+                        <a:lnSpc>
+                          <a:spcPct val="100000"/>
+                        </a:lnSpc>
+                        <a:spcBef>
+                          <a:spcPts val="0"/>
+                        </a:spcBef>
+                        <a:spcAft>
+                          <a:spcPts val="0"/>
+                        </a:spcAft>
+                        <a:buClrTx/>
+                        <a:buSzTx/>
+                        <a:buFontTx/>
+                        <a:buNone/>
+                        <a:tabLst/>
+                        <a:defRPr/>
+                      </a:pPr>
+                      <a:r>
+                        <a:rPr lang="en-US" altLang="zh-CN" sz="1100" b="1" kern="1200" baseline="0" dirty="0" smtClean="0">
+                          <a:solidFill>
+                            <a:schemeClr val="tx1"/>
+                          </a:solidFill>
+                          <a:latin typeface="微软雅黑" panose="020B0503020204020204" pitchFamily="34" charset="-122"/>
+                          <a:ea typeface="微软雅黑" panose="020B0503020204020204" pitchFamily="34" charset="-122"/>
+                          <a:cs typeface="+mn-cs"/>
+                        </a:rPr>
+                        <a:t>Advanced Photonics</a:t>
+                      </a:r>
+                      <a:r>
+                        <a:rPr lang="zh-CN" altLang="en-US" sz="1100" b="1" kern="1200" baseline="0" dirty="0" smtClean="0">
+                          <a:solidFill>
+                            <a:schemeClr val="tx1"/>
+                          </a:solidFill>
+                          <a:latin typeface="微软雅黑" panose="020B0503020204020204" pitchFamily="34" charset="-122"/>
+                          <a:ea typeface="微软雅黑" panose="020B0503020204020204" pitchFamily="34" charset="-122"/>
+                          <a:cs typeface="+mn-cs"/>
+                        </a:rPr>
+                        <a:t>杂志介绍</a:t>
+                      </a:r>
                     </a:p>
                   </a:txBody>
                   <a:tcPr marL="110604" marR="110604" marT="28714" marB="28714" anchor="ctr"/>
                 </a:tc>
                 <a:extLst>
                   <a:ext uri="{0D108BD9-81ED-4DB2-BD59-A6C34878D82A}">
-                    <a16:rowId xmlns="" xmlns:a16="http://schemas.microsoft.com/office/drawing/2014/main" val="10005"/>
+                    <a16:rowId xmlns:a16="http://schemas.microsoft.com/office/drawing/2014/main" xmlns="" val="10005"/>
                   </a:ext>
                 </a:extLst>
               </a:tr>

</xml_diff>